<commit_message>
Update CS 25-347_Poster Rough Draft (1).pptx
</commit_message>
<xml_diff>
--- a/Project Deliverables/CS 25-347_Poster Rough Draft (1).pptx
+++ b/Project Deliverables/CS 25-347_Poster Rough Draft (1).pptx
@@ -127,15 +127,15 @@
 </file>
 
 <file path=ppt/diagrams/colors1.xml><?xml version="1.0" encoding="utf-8"?>
-<dgm:colorsDef xmlns:dgm="http://schemas.openxmlformats.org/drawingml/2006/diagram" xmlns:a="http://schemas.openxmlformats.org/drawingml/2006/main" uniqueId="urn:microsoft.com/office/officeart/2005/8/colors/accent1_2">
+<dgm:colorsDef xmlns:dgm="http://schemas.openxmlformats.org/drawingml/2006/diagram" xmlns:a="http://schemas.openxmlformats.org/drawingml/2006/main" uniqueId="urn:microsoft.com/office/officeart/2005/8/colors/colorful5">
   <dgm:title val=""/>
   <dgm:desc val=""/>
   <dgm:catLst>
-    <dgm:cat type="accent1" pri="11200"/>
+    <dgm:cat type="colorful" pri="10500"/>
   </dgm:catLst>
   <dgm:styleLbl name="node0">
     <dgm:fillClrLst meth="repeat">
-      <a:schemeClr val="accent1"/>
+      <a:schemeClr val="accent4"/>
     </dgm:fillClrLst>
     <dgm:linClrLst meth="repeat">
       <a:schemeClr val="lt1"/>
@@ -145,21 +145,10 @@
     <dgm:txFillClrLst/>
     <dgm:txEffectClrLst/>
   </dgm:styleLbl>
-  <dgm:styleLbl name="alignNode1">
-    <dgm:fillClrLst meth="repeat">
-      <a:schemeClr val="accent1"/>
-    </dgm:fillClrLst>
-    <dgm:linClrLst meth="repeat">
-      <a:schemeClr val="accent1"/>
-    </dgm:linClrLst>
-    <dgm:effectClrLst/>
-    <dgm:txLinClrLst/>
-    <dgm:txFillClrLst/>
-    <dgm:txEffectClrLst/>
-  </dgm:styleLbl>
   <dgm:styleLbl name="node1">
-    <dgm:fillClrLst meth="repeat">
-      <a:schemeClr val="accent1"/>
+    <dgm:fillClrLst>
+      <a:schemeClr val="accent5"/>
+      <a:schemeClr val="accent6"/>
     </dgm:fillClrLst>
     <dgm:linClrLst meth="repeat">
       <a:schemeClr val="lt1"/>
@@ -169,9 +158,24 @@
     <dgm:txFillClrLst/>
     <dgm:txEffectClrLst/>
   </dgm:styleLbl>
+  <dgm:styleLbl name="alignNode1">
+    <dgm:fillClrLst>
+      <a:schemeClr val="accent5"/>
+      <a:schemeClr val="accent6"/>
+    </dgm:fillClrLst>
+    <dgm:linClrLst>
+      <a:schemeClr val="accent5"/>
+      <a:schemeClr val="accent6"/>
+    </dgm:linClrLst>
+    <dgm:effectClrLst/>
+    <dgm:txLinClrLst/>
+    <dgm:txFillClrLst/>
+    <dgm:txEffectClrLst/>
+  </dgm:styleLbl>
   <dgm:styleLbl name="lnNode1">
-    <dgm:fillClrLst meth="repeat">
-      <a:schemeClr val="accent1"/>
+    <dgm:fillClrLst>
+      <a:schemeClr val="accent5"/>
+      <a:schemeClr val="accent6"/>
     </dgm:fillClrLst>
     <dgm:linClrLst meth="repeat">
       <a:schemeClr val="lt1"/>
@@ -182,8 +186,11 @@
     <dgm:txEffectClrLst/>
   </dgm:styleLbl>
   <dgm:styleLbl name="vennNode1">
-    <dgm:fillClrLst meth="repeat">
-      <a:schemeClr val="accent1">
+    <dgm:fillClrLst>
+      <a:schemeClr val="accent5">
+        <a:alpha val="50000"/>
+      </a:schemeClr>
+      <a:schemeClr val="accent6">
         <a:alpha val="50000"/>
       </a:schemeClr>
     </dgm:fillClrLst>
@@ -196,7 +203,19 @@
     <dgm:txEffectClrLst/>
   </dgm:styleLbl>
   <dgm:styleLbl name="node2">
-    <dgm:fillClrLst meth="repeat">
+    <dgm:fillClrLst>
+      <a:schemeClr val="accent6"/>
+    </dgm:fillClrLst>
+    <dgm:linClrLst meth="repeat">
+      <a:schemeClr val="lt1"/>
+    </dgm:linClrLst>
+    <dgm:effectClrLst/>
+    <dgm:txLinClrLst/>
+    <dgm:txFillClrLst/>
+    <dgm:txEffectClrLst/>
+  </dgm:styleLbl>
+  <dgm:styleLbl name="node3">
+    <dgm:fillClrLst>
       <a:schemeClr val="accent1"/>
     </dgm:fillClrLst>
     <dgm:linClrLst meth="repeat">
@@ -207,9 +226,9 @@
     <dgm:txFillClrLst/>
     <dgm:txEffectClrLst/>
   </dgm:styleLbl>
-  <dgm:styleLbl name="node3">
-    <dgm:fillClrLst meth="repeat">
-      <a:schemeClr val="accent1"/>
+  <dgm:styleLbl name="node4">
+    <dgm:fillClrLst>
+      <a:schemeClr val="accent2"/>
     </dgm:fillClrLst>
     <dgm:linClrLst meth="repeat">
       <a:schemeClr val="lt1"/>
@@ -219,21 +238,12 @@
     <dgm:txFillClrLst/>
     <dgm:txEffectClrLst/>
   </dgm:styleLbl>
-  <dgm:styleLbl name="node4">
-    <dgm:fillClrLst meth="repeat">
-      <a:schemeClr val="accent1"/>
-    </dgm:fillClrLst>
-    <dgm:linClrLst meth="repeat">
-      <a:schemeClr val="lt1"/>
-    </dgm:linClrLst>
-    <dgm:effectClrLst/>
-    <dgm:txLinClrLst/>
-    <dgm:txFillClrLst/>
-    <dgm:txEffectClrLst/>
-  </dgm:styleLbl>
   <dgm:styleLbl name="fgImgPlace1">
-    <dgm:fillClrLst meth="repeat">
-      <a:schemeClr val="accent1">
+    <dgm:fillClrLst>
+      <a:schemeClr val="accent5">
+        <a:tint val="50000"/>
+      </a:schemeClr>
+      <a:schemeClr val="accent6">
         <a:tint val="50000"/>
       </a:schemeClr>
     </dgm:fillClrLst>
@@ -248,9 +258,12 @@
     <dgm:txEffectClrLst/>
   </dgm:styleLbl>
   <dgm:styleLbl name="alignImgPlace1">
-    <dgm:fillClrLst meth="repeat">
-      <a:schemeClr val="accent1">
+    <dgm:fillClrLst>
+      <a:schemeClr val="accent5">
         <a:tint val="50000"/>
+      </a:schemeClr>
+      <a:schemeClr val="accent6">
+        <a:tint val="20000"/>
       </a:schemeClr>
     </dgm:fillClrLst>
     <dgm:linClrLst meth="repeat">
@@ -264,9 +277,12 @@
     <dgm:txEffectClrLst/>
   </dgm:styleLbl>
   <dgm:styleLbl name="bgImgPlace1">
-    <dgm:fillClrLst meth="repeat">
-      <a:schemeClr val="accent1">
+    <dgm:fillClrLst>
+      <a:schemeClr val="accent5">
         <a:tint val="50000"/>
+      </a:schemeClr>
+      <a:schemeClr val="accent6">
+        <a:tint val="20000"/>
       </a:schemeClr>
     </dgm:fillClrLst>
     <dgm:linClrLst meth="repeat">
@@ -280,14 +296,84 @@
     <dgm:txEffectClrLst/>
   </dgm:styleLbl>
   <dgm:styleLbl name="sibTrans2D1">
-    <dgm:fillClrLst meth="repeat">
-      <a:schemeClr val="accent1">
-        <a:tint val="60000"/>
-      </a:schemeClr>
+    <dgm:fillClrLst>
+      <a:schemeClr val="accent5"/>
+      <a:schemeClr val="accent6"/>
     </dgm:fillClrLst>
     <dgm:linClrLst meth="repeat">
-      <a:schemeClr val="accent1">
-        <a:tint val="60000"/>
+      <a:schemeClr val="lt1"/>
+    </dgm:linClrLst>
+    <dgm:effectClrLst/>
+    <dgm:txLinClrLst/>
+    <dgm:txFillClrLst/>
+    <dgm:txEffectClrLst/>
+  </dgm:styleLbl>
+  <dgm:styleLbl name="fgSibTrans2D1">
+    <dgm:fillClrLst>
+      <a:schemeClr val="accent5"/>
+      <a:schemeClr val="accent6"/>
+    </dgm:fillClrLst>
+    <dgm:linClrLst meth="repeat">
+      <a:schemeClr val="lt1"/>
+    </dgm:linClrLst>
+    <dgm:effectClrLst/>
+    <dgm:txLinClrLst/>
+    <dgm:txFillClrLst meth="repeat">
+      <a:schemeClr val="lt1"/>
+    </dgm:txFillClrLst>
+    <dgm:txEffectClrLst/>
+  </dgm:styleLbl>
+  <dgm:styleLbl name="bgSibTrans2D1">
+    <dgm:fillClrLst>
+      <a:schemeClr val="accent5"/>
+      <a:schemeClr val="accent6"/>
+    </dgm:fillClrLst>
+    <dgm:linClrLst meth="repeat">
+      <a:schemeClr val="lt1"/>
+    </dgm:linClrLst>
+    <dgm:effectClrLst/>
+    <dgm:txLinClrLst/>
+    <dgm:txFillClrLst meth="repeat">
+      <a:schemeClr val="lt1"/>
+    </dgm:txFillClrLst>
+    <dgm:txEffectClrLst/>
+  </dgm:styleLbl>
+  <dgm:styleLbl name="sibTrans1D1">
+    <dgm:fillClrLst/>
+    <dgm:linClrLst>
+      <a:schemeClr val="accent5"/>
+      <a:schemeClr val="accent6"/>
+    </dgm:linClrLst>
+    <dgm:effectClrLst/>
+    <dgm:txLinClrLst/>
+    <dgm:txFillClrLst meth="repeat">
+      <a:schemeClr val="tx1"/>
+    </dgm:txFillClrLst>
+    <dgm:txEffectClrLst/>
+  </dgm:styleLbl>
+  <dgm:styleLbl name="callout">
+    <dgm:fillClrLst meth="repeat">
+      <a:schemeClr val="accent5"/>
+    </dgm:fillClrLst>
+    <dgm:linClrLst meth="repeat">
+      <a:schemeClr val="accent5">
+        <a:tint val="50000"/>
+      </a:schemeClr>
+    </dgm:linClrLst>
+    <dgm:effectClrLst/>
+    <dgm:txLinClrLst/>
+    <dgm:txFillClrLst meth="repeat">
+      <a:schemeClr val="tx1"/>
+    </dgm:txFillClrLst>
+    <dgm:txEffectClrLst/>
+  </dgm:styleLbl>
+  <dgm:styleLbl name="asst0">
+    <dgm:fillClrLst meth="repeat">
+      <a:schemeClr val="accent5"/>
+    </dgm:fillClrLst>
+    <dgm:linClrLst meth="repeat">
+      <a:schemeClr val="lt1">
+        <a:shade val="80000"/>
       </a:schemeClr>
     </dgm:linClrLst>
     <dgm:effectClrLst/>
@@ -295,15 +381,13 @@
     <dgm:txFillClrLst/>
     <dgm:txEffectClrLst/>
   </dgm:styleLbl>
-  <dgm:styleLbl name="fgSibTrans2D1">
+  <dgm:styleLbl name="asst1">
     <dgm:fillClrLst meth="repeat">
-      <a:schemeClr val="accent1">
-        <a:tint val="60000"/>
-      </a:schemeClr>
+      <a:schemeClr val="accent6"/>
     </dgm:fillClrLst>
     <dgm:linClrLst meth="repeat">
-      <a:schemeClr val="accent1">
-        <a:tint val="60000"/>
+      <a:schemeClr val="lt1">
+        <a:shade val="80000"/>
       </a:schemeClr>
     </dgm:linClrLst>
     <dgm:effectClrLst/>
@@ -311,25 +395,129 @@
     <dgm:txFillClrLst/>
     <dgm:txEffectClrLst/>
   </dgm:styleLbl>
-  <dgm:styleLbl name="bgSibTrans2D1">
-    <dgm:fillClrLst meth="repeat">
-      <a:schemeClr val="accent1">
-        <a:tint val="60000"/>
-      </a:schemeClr>
+  <dgm:styleLbl name="asst2">
+    <dgm:fillClrLst>
+      <a:schemeClr val="accent1"/>
     </dgm:fillClrLst>
     <dgm:linClrLst meth="repeat">
-      <a:schemeClr val="accent1">
-        <a:tint val="60000"/>
-      </a:schemeClr>
+      <a:schemeClr val="lt1"/>
     </dgm:linClrLst>
     <dgm:effectClrLst/>
     <dgm:txLinClrLst/>
     <dgm:txFillClrLst/>
     <dgm:txEffectClrLst/>
   </dgm:styleLbl>
-  <dgm:styleLbl name="sibTrans1D1">
+  <dgm:styleLbl name="asst3">
+    <dgm:fillClrLst>
+      <a:schemeClr val="accent2"/>
+    </dgm:fillClrLst>
+    <dgm:linClrLst meth="repeat">
+      <a:schemeClr val="lt1"/>
+    </dgm:linClrLst>
+    <dgm:effectClrLst/>
+    <dgm:txLinClrLst/>
+    <dgm:txFillClrLst/>
+    <dgm:txEffectClrLst/>
+  </dgm:styleLbl>
+  <dgm:styleLbl name="asst4">
+    <dgm:fillClrLst>
+      <a:schemeClr val="accent3"/>
+    </dgm:fillClrLst>
+    <dgm:linClrLst meth="repeat">
+      <a:schemeClr val="lt1"/>
+    </dgm:linClrLst>
+    <dgm:effectClrLst/>
+    <dgm:txLinClrLst/>
+    <dgm:txFillClrLst/>
+    <dgm:txEffectClrLst/>
+  </dgm:styleLbl>
+  <dgm:styleLbl name="parChTrans2D1">
+    <dgm:fillClrLst meth="repeat">
+      <a:schemeClr val="accent5"/>
+    </dgm:fillClrLst>
+    <dgm:linClrLst meth="repeat">
+      <a:schemeClr val="lt1"/>
+    </dgm:linClrLst>
+    <dgm:effectClrLst/>
+    <dgm:txLinClrLst/>
+    <dgm:txFillClrLst meth="repeat">
+      <a:schemeClr val="lt1"/>
+    </dgm:txFillClrLst>
+    <dgm:txEffectClrLst/>
+  </dgm:styleLbl>
+  <dgm:styleLbl name="parChTrans2D2">
+    <dgm:fillClrLst meth="repeat">
+      <a:schemeClr val="accent6"/>
+    </dgm:fillClrLst>
+    <dgm:linClrLst meth="repeat">
+      <a:schemeClr val="lt1"/>
+    </dgm:linClrLst>
+    <dgm:effectClrLst/>
+    <dgm:txLinClrLst/>
+    <dgm:txFillClrLst/>
+    <dgm:txEffectClrLst/>
+  </dgm:styleLbl>
+  <dgm:styleLbl name="parChTrans2D3">
+    <dgm:fillClrLst meth="repeat">
+      <a:schemeClr val="accent6"/>
+    </dgm:fillClrLst>
+    <dgm:linClrLst meth="repeat">
+      <a:schemeClr val="lt1"/>
+    </dgm:linClrLst>
+    <dgm:effectClrLst/>
+    <dgm:txLinClrLst/>
+    <dgm:txFillClrLst/>
+    <dgm:txEffectClrLst/>
+  </dgm:styleLbl>
+  <dgm:styleLbl name="parChTrans2D4">
     <dgm:fillClrLst meth="repeat">
       <a:schemeClr val="accent1"/>
+    </dgm:fillClrLst>
+    <dgm:linClrLst meth="repeat">
+      <a:schemeClr val="lt1"/>
+    </dgm:linClrLst>
+    <dgm:effectClrLst/>
+    <dgm:txLinClrLst/>
+    <dgm:txFillClrLst meth="repeat">
+      <a:schemeClr val="lt1"/>
+    </dgm:txFillClrLst>
+    <dgm:txEffectClrLst/>
+  </dgm:styleLbl>
+  <dgm:styleLbl name="parChTrans1D1">
+    <dgm:fillClrLst meth="repeat">
+      <a:schemeClr val="accent5"/>
+    </dgm:fillClrLst>
+    <dgm:linClrLst meth="repeat">
+      <a:schemeClr val="accent5"/>
+    </dgm:linClrLst>
+    <dgm:effectClrLst/>
+    <dgm:txLinClrLst/>
+    <dgm:txFillClrLst meth="repeat">
+      <a:schemeClr val="tx1"/>
+    </dgm:txFillClrLst>
+    <dgm:txEffectClrLst/>
+  </dgm:styleLbl>
+  <dgm:styleLbl name="parChTrans1D2">
+    <dgm:fillClrLst meth="repeat">
+      <a:schemeClr val="accent6">
+        <a:tint val="90000"/>
+      </a:schemeClr>
+    </dgm:fillClrLst>
+    <dgm:linClrLst meth="repeat">
+      <a:schemeClr val="accent6"/>
+    </dgm:linClrLst>
+    <dgm:effectClrLst/>
+    <dgm:txLinClrLst/>
+    <dgm:txFillClrLst meth="repeat">
+      <a:schemeClr val="tx1"/>
+    </dgm:txFillClrLst>
+    <dgm:txEffectClrLst/>
+  </dgm:styleLbl>
+  <dgm:styleLbl name="parChTrans1D3">
+    <dgm:fillClrLst meth="repeat">
+      <a:schemeClr val="accent6">
+        <a:tint val="70000"/>
+      </a:schemeClr>
     </dgm:fillClrLst>
     <dgm:linClrLst meth="repeat">
       <a:schemeClr val="accent1"/>
@@ -341,14 +529,14 @@
     </dgm:txFillClrLst>
     <dgm:txEffectClrLst/>
   </dgm:styleLbl>
-  <dgm:styleLbl name="callout">
+  <dgm:styleLbl name="parChTrans1D4">
     <dgm:fillClrLst meth="repeat">
-      <a:schemeClr val="accent1"/>
+      <a:schemeClr val="accent6">
+        <a:tint val="50000"/>
+      </a:schemeClr>
     </dgm:fillClrLst>
     <dgm:linClrLst meth="repeat">
-      <a:schemeClr val="accent1">
-        <a:tint val="50000"/>
-      </a:schemeClr>
+      <a:schemeClr val="accent2"/>
     </dgm:linClrLst>
     <dgm:effectClrLst/>
     <dgm:txLinClrLst/>
@@ -357,197 +545,258 @@
     </dgm:txFillClrLst>
     <dgm:txEffectClrLst/>
   </dgm:styleLbl>
-  <dgm:styleLbl name="asst0">
-    <dgm:fillClrLst meth="repeat">
-      <a:schemeClr val="accent1"/>
-    </dgm:fillClrLst>
-    <dgm:linClrLst meth="repeat">
-      <a:schemeClr val="lt1"/>
-    </dgm:linClrLst>
-    <dgm:effectClrLst/>
-    <dgm:txLinClrLst/>
-    <dgm:txFillClrLst/>
-    <dgm:txEffectClrLst/>
-  </dgm:styleLbl>
-  <dgm:styleLbl name="asst1">
-    <dgm:fillClrLst meth="repeat">
-      <a:schemeClr val="accent1"/>
-    </dgm:fillClrLst>
-    <dgm:linClrLst meth="repeat">
-      <a:schemeClr val="lt1"/>
-    </dgm:linClrLst>
-    <dgm:effectClrLst/>
-    <dgm:txLinClrLst/>
-    <dgm:txFillClrLst/>
-    <dgm:txEffectClrLst/>
-  </dgm:styleLbl>
-  <dgm:styleLbl name="asst2">
-    <dgm:fillClrLst meth="repeat">
-      <a:schemeClr val="accent1"/>
-    </dgm:fillClrLst>
-    <dgm:linClrLst meth="repeat">
-      <a:schemeClr val="lt1"/>
-    </dgm:linClrLst>
-    <dgm:effectClrLst/>
-    <dgm:txLinClrLst/>
-    <dgm:txFillClrLst/>
-    <dgm:txEffectClrLst/>
-  </dgm:styleLbl>
-  <dgm:styleLbl name="asst3">
-    <dgm:fillClrLst meth="repeat">
-      <a:schemeClr val="accent1"/>
-    </dgm:fillClrLst>
-    <dgm:linClrLst meth="repeat">
-      <a:schemeClr val="lt1"/>
-    </dgm:linClrLst>
-    <dgm:effectClrLst/>
-    <dgm:txLinClrLst/>
-    <dgm:txFillClrLst/>
-    <dgm:txEffectClrLst/>
-  </dgm:styleLbl>
-  <dgm:styleLbl name="asst4">
-    <dgm:fillClrLst meth="repeat">
-      <a:schemeClr val="accent1"/>
-    </dgm:fillClrLst>
-    <dgm:linClrLst meth="repeat">
-      <a:schemeClr val="lt1"/>
-    </dgm:linClrLst>
-    <dgm:effectClrLst/>
-    <dgm:txLinClrLst/>
-    <dgm:txFillClrLst/>
-    <dgm:txEffectClrLst/>
-  </dgm:styleLbl>
-  <dgm:styleLbl name="parChTrans2D1">
-    <dgm:fillClrLst meth="repeat">
-      <a:schemeClr val="accent1">
-        <a:tint val="60000"/>
-      </a:schemeClr>
-    </dgm:fillClrLst>
-    <dgm:linClrLst meth="repeat">
-      <a:schemeClr val="accent1">
-        <a:tint val="60000"/>
-      </a:schemeClr>
-    </dgm:linClrLst>
-    <dgm:effectClrLst/>
-    <dgm:txLinClrLst/>
-    <dgm:txFillClrLst meth="repeat">
-      <a:schemeClr val="lt1"/>
-    </dgm:txFillClrLst>
-    <dgm:txEffectClrLst/>
-  </dgm:styleLbl>
-  <dgm:styleLbl name="parChTrans2D2">
-    <dgm:fillClrLst meth="repeat">
-      <a:schemeClr val="accent1"/>
-    </dgm:fillClrLst>
-    <dgm:linClrLst meth="repeat">
-      <a:schemeClr val="accent1"/>
-    </dgm:linClrLst>
-    <dgm:effectClrLst/>
-    <dgm:txLinClrLst/>
-    <dgm:txFillClrLst meth="repeat">
-      <a:schemeClr val="lt1"/>
-    </dgm:txFillClrLst>
-    <dgm:txEffectClrLst/>
-  </dgm:styleLbl>
-  <dgm:styleLbl name="parChTrans2D3">
-    <dgm:fillClrLst meth="repeat">
-      <a:schemeClr val="accent1"/>
-    </dgm:fillClrLst>
-    <dgm:linClrLst meth="repeat">
-      <a:schemeClr val="accent1"/>
-    </dgm:linClrLst>
-    <dgm:effectClrLst/>
-    <dgm:txLinClrLst/>
-    <dgm:txFillClrLst meth="repeat">
-      <a:schemeClr val="lt1"/>
-    </dgm:txFillClrLst>
-    <dgm:txEffectClrLst/>
-  </dgm:styleLbl>
-  <dgm:styleLbl name="parChTrans2D4">
-    <dgm:fillClrLst meth="repeat">
-      <a:schemeClr val="accent1"/>
-    </dgm:fillClrLst>
-    <dgm:linClrLst meth="repeat">
-      <a:schemeClr val="accent1"/>
-    </dgm:linClrLst>
-    <dgm:effectClrLst/>
-    <dgm:txLinClrLst/>
-    <dgm:txFillClrLst meth="repeat">
-      <a:schemeClr val="lt1"/>
-    </dgm:txFillClrLst>
-    <dgm:txEffectClrLst/>
-  </dgm:styleLbl>
-  <dgm:styleLbl name="parChTrans1D1">
-    <dgm:fillClrLst meth="repeat">
-      <a:schemeClr val="accent1"/>
-    </dgm:fillClrLst>
-    <dgm:linClrLst meth="repeat">
-      <a:schemeClr val="accent1">
-        <a:shade val="60000"/>
-      </a:schemeClr>
-    </dgm:linClrLst>
-    <dgm:effectClrLst/>
-    <dgm:txLinClrLst/>
-    <dgm:txFillClrLst meth="repeat">
-      <a:schemeClr val="tx1"/>
-    </dgm:txFillClrLst>
-    <dgm:txEffectClrLst/>
-  </dgm:styleLbl>
-  <dgm:styleLbl name="parChTrans1D2">
-    <dgm:fillClrLst meth="repeat">
-      <a:schemeClr val="accent1"/>
-    </dgm:fillClrLst>
-    <dgm:linClrLst meth="repeat">
-      <a:schemeClr val="accent1">
-        <a:shade val="60000"/>
-      </a:schemeClr>
-    </dgm:linClrLst>
-    <dgm:effectClrLst/>
-    <dgm:txLinClrLst/>
-    <dgm:txFillClrLst meth="repeat">
-      <a:schemeClr val="tx1"/>
-    </dgm:txFillClrLst>
-    <dgm:txEffectClrLst/>
-  </dgm:styleLbl>
-  <dgm:styleLbl name="parChTrans1D3">
-    <dgm:fillClrLst meth="repeat">
-      <a:schemeClr val="accent1"/>
-    </dgm:fillClrLst>
-    <dgm:linClrLst meth="repeat">
-      <a:schemeClr val="accent1">
-        <a:shade val="80000"/>
-      </a:schemeClr>
-    </dgm:linClrLst>
-    <dgm:effectClrLst/>
-    <dgm:txLinClrLst/>
-    <dgm:txFillClrLst meth="repeat">
-      <a:schemeClr val="tx1"/>
-    </dgm:txFillClrLst>
-    <dgm:txEffectClrLst/>
-  </dgm:styleLbl>
-  <dgm:styleLbl name="parChTrans1D4">
-    <dgm:fillClrLst meth="repeat">
-      <a:schemeClr val="accent1"/>
-    </dgm:fillClrLst>
-    <dgm:linClrLst meth="repeat">
-      <a:schemeClr val="accent1">
-        <a:shade val="80000"/>
-      </a:schemeClr>
-    </dgm:linClrLst>
-    <dgm:effectClrLst/>
-    <dgm:txLinClrLst/>
-    <dgm:txFillClrLst meth="repeat">
-      <a:schemeClr val="tx1"/>
-    </dgm:txFillClrLst>
-    <dgm:txEffectClrLst/>
-  </dgm:styleLbl>
   <dgm:styleLbl name="fgAcc1">
     <dgm:fillClrLst meth="repeat">
       <a:schemeClr val="lt1">
         <a:alpha val="90000"/>
       </a:schemeClr>
     </dgm:fillClrLst>
+    <dgm:linClrLst>
+      <a:schemeClr val="accent5"/>
+      <a:schemeClr val="accent6"/>
+    </dgm:linClrLst>
+    <dgm:effectClrLst/>
+    <dgm:txLinClrLst/>
+    <dgm:txFillClrLst meth="repeat">
+      <a:schemeClr val="dk1"/>
+    </dgm:txFillClrLst>
+    <dgm:txEffectClrLst/>
+  </dgm:styleLbl>
+  <dgm:styleLbl name="conFgAcc1">
+    <dgm:fillClrLst meth="repeat">
+      <a:schemeClr val="lt1">
+        <a:alpha val="90000"/>
+      </a:schemeClr>
+    </dgm:fillClrLst>
+    <dgm:linClrLst>
+      <a:schemeClr val="accent5"/>
+      <a:schemeClr val="accent6"/>
+    </dgm:linClrLst>
+    <dgm:effectClrLst/>
+    <dgm:txLinClrLst/>
+    <dgm:txFillClrLst meth="repeat">
+      <a:schemeClr val="dk1"/>
+    </dgm:txFillClrLst>
+    <dgm:txEffectClrLst/>
+  </dgm:styleLbl>
+  <dgm:styleLbl name="alignAcc1">
+    <dgm:fillClrLst meth="repeat">
+      <a:schemeClr val="lt1">
+        <a:alpha val="90000"/>
+      </a:schemeClr>
+    </dgm:fillClrLst>
+    <dgm:linClrLst>
+      <a:schemeClr val="accent5"/>
+      <a:schemeClr val="accent6"/>
+    </dgm:linClrLst>
+    <dgm:effectClrLst/>
+    <dgm:txLinClrLst/>
+    <dgm:txFillClrLst meth="repeat">
+      <a:schemeClr val="dk1"/>
+    </dgm:txFillClrLst>
+    <dgm:txEffectClrLst/>
+  </dgm:styleLbl>
+  <dgm:styleLbl name="trAlignAcc1">
+    <dgm:fillClrLst meth="repeat">
+      <a:schemeClr val="lt1">
+        <a:alpha val="40000"/>
+      </a:schemeClr>
+    </dgm:fillClrLst>
     <dgm:linClrLst meth="repeat">
+      <a:schemeClr val="accent5"/>
+    </dgm:linClrLst>
+    <dgm:effectClrLst/>
+    <dgm:txLinClrLst/>
+    <dgm:txFillClrLst meth="repeat">
+      <a:schemeClr val="dk1"/>
+    </dgm:txFillClrLst>
+    <dgm:txEffectClrLst/>
+  </dgm:styleLbl>
+  <dgm:styleLbl name="bgAcc1">
+    <dgm:fillClrLst meth="repeat">
+      <a:schemeClr val="lt1">
+        <a:alpha val="90000"/>
+      </a:schemeClr>
+    </dgm:fillClrLst>
+    <dgm:linClrLst>
+      <a:schemeClr val="accent5"/>
+      <a:schemeClr val="accent6"/>
+    </dgm:linClrLst>
+    <dgm:effectClrLst/>
+    <dgm:txLinClrLst/>
+    <dgm:txFillClrLst meth="repeat">
+      <a:schemeClr val="dk1"/>
+    </dgm:txFillClrLst>
+    <dgm:txEffectClrLst/>
+  </dgm:styleLbl>
+  <dgm:styleLbl name="solidFgAcc1">
+    <dgm:fillClrLst meth="repeat">
+      <a:schemeClr val="lt1"/>
+    </dgm:fillClrLst>
+    <dgm:linClrLst>
+      <a:schemeClr val="accent5"/>
+      <a:schemeClr val="accent6"/>
+    </dgm:linClrLst>
+    <dgm:effectClrLst/>
+    <dgm:txLinClrLst/>
+    <dgm:txFillClrLst meth="repeat">
+      <a:schemeClr val="dk1"/>
+    </dgm:txFillClrLst>
+    <dgm:txEffectClrLst/>
+  </dgm:styleLbl>
+  <dgm:styleLbl name="solidAlignAcc1">
+    <dgm:fillClrLst meth="repeat">
+      <a:schemeClr val="lt1"/>
+    </dgm:fillClrLst>
+    <dgm:linClrLst>
+      <a:schemeClr val="accent5"/>
+      <a:schemeClr val="accent6"/>
+    </dgm:linClrLst>
+    <dgm:effectClrLst/>
+    <dgm:txLinClrLst/>
+    <dgm:txFillClrLst meth="repeat">
+      <a:schemeClr val="dk1"/>
+    </dgm:txFillClrLst>
+    <dgm:txEffectClrLst/>
+  </dgm:styleLbl>
+  <dgm:styleLbl name="solidBgAcc1">
+    <dgm:fillClrLst meth="repeat">
+      <a:schemeClr val="lt1"/>
+    </dgm:fillClrLst>
+    <dgm:linClrLst>
+      <a:schemeClr val="accent5"/>
+      <a:schemeClr val="accent6"/>
+    </dgm:linClrLst>
+    <dgm:effectClrLst/>
+    <dgm:txLinClrLst/>
+    <dgm:txFillClrLst meth="repeat">
+      <a:schemeClr val="dk1"/>
+    </dgm:txFillClrLst>
+    <dgm:txEffectClrLst/>
+  </dgm:styleLbl>
+  <dgm:styleLbl name="fgAccFollowNode1">
+    <dgm:fillClrLst>
+      <a:schemeClr val="accent5">
+        <a:tint val="40000"/>
+        <a:alpha val="90000"/>
+      </a:schemeClr>
+      <a:schemeClr val="accent6">
+        <a:tint val="40000"/>
+        <a:alpha val="90000"/>
+      </a:schemeClr>
+    </dgm:fillClrLst>
+    <dgm:linClrLst>
+      <a:schemeClr val="accent5">
+        <a:tint val="40000"/>
+        <a:alpha val="90000"/>
+      </a:schemeClr>
+      <a:schemeClr val="accent5">
+        <a:tint val="40000"/>
+        <a:alpha val="90000"/>
+      </a:schemeClr>
+    </dgm:linClrLst>
+    <dgm:effectClrLst/>
+    <dgm:txLinClrLst/>
+    <dgm:txFillClrLst meth="repeat">
+      <a:schemeClr val="dk1"/>
+    </dgm:txFillClrLst>
+    <dgm:txEffectClrLst/>
+  </dgm:styleLbl>
+  <dgm:styleLbl name="alignAccFollowNode1">
+    <dgm:fillClrLst>
+      <a:schemeClr val="accent5">
+        <a:tint val="40000"/>
+        <a:alpha val="90000"/>
+      </a:schemeClr>
+      <a:schemeClr val="accent6">
+        <a:tint val="40000"/>
+        <a:alpha val="90000"/>
+      </a:schemeClr>
+    </dgm:fillClrLst>
+    <dgm:linClrLst>
+      <a:schemeClr val="accent5">
+        <a:tint val="40000"/>
+        <a:alpha val="90000"/>
+      </a:schemeClr>
+      <a:schemeClr val="accent6">
+        <a:tint val="40000"/>
+        <a:alpha val="90000"/>
+      </a:schemeClr>
+    </dgm:linClrLst>
+    <dgm:effectClrLst/>
+    <dgm:txLinClrLst/>
+    <dgm:txFillClrLst meth="repeat">
+      <a:schemeClr val="dk1"/>
+    </dgm:txFillClrLst>
+    <dgm:txEffectClrLst/>
+  </dgm:styleLbl>
+  <dgm:styleLbl name="bgAccFollowNode1">
+    <dgm:fillClrLst>
+      <a:schemeClr val="accent5">
+        <a:tint val="40000"/>
+        <a:alpha val="90000"/>
+      </a:schemeClr>
+      <a:schemeClr val="accent6">
+        <a:tint val="40000"/>
+        <a:alpha val="90000"/>
+      </a:schemeClr>
+    </dgm:fillClrLst>
+    <dgm:linClrLst>
+      <a:schemeClr val="accent5">
+        <a:tint val="40000"/>
+        <a:alpha val="90000"/>
+      </a:schemeClr>
+      <a:schemeClr val="accent6">
+        <a:tint val="40000"/>
+        <a:alpha val="90000"/>
+      </a:schemeClr>
+    </dgm:linClrLst>
+    <dgm:effectClrLst/>
+    <dgm:txLinClrLst/>
+    <dgm:txFillClrLst meth="repeat">
+      <a:schemeClr val="dk1"/>
+    </dgm:txFillClrLst>
+    <dgm:txEffectClrLst/>
+  </dgm:styleLbl>
+  <dgm:styleLbl name="fgAcc0">
+    <dgm:fillClrLst meth="repeat">
+      <a:schemeClr val="lt1">
+        <a:alpha val="90000"/>
+      </a:schemeClr>
+    </dgm:fillClrLst>
+    <dgm:linClrLst>
+      <a:schemeClr val="accent4"/>
+    </dgm:linClrLst>
+    <dgm:effectClrLst/>
+    <dgm:txLinClrLst/>
+    <dgm:txFillClrLst meth="repeat">
+      <a:schemeClr val="dk1"/>
+    </dgm:txFillClrLst>
+    <dgm:txEffectClrLst/>
+  </dgm:styleLbl>
+  <dgm:styleLbl name="fgAcc2">
+    <dgm:fillClrLst meth="repeat">
+      <a:schemeClr val="lt1">
+        <a:alpha val="90000"/>
+      </a:schemeClr>
+    </dgm:fillClrLst>
+    <dgm:linClrLst>
+      <a:schemeClr val="accent6"/>
+    </dgm:linClrLst>
+    <dgm:effectClrLst/>
+    <dgm:txLinClrLst/>
+    <dgm:txFillClrLst meth="repeat">
+      <a:schemeClr val="dk1"/>
+    </dgm:txFillClrLst>
+    <dgm:txEffectClrLst/>
+  </dgm:styleLbl>
+  <dgm:styleLbl name="fgAcc3">
+    <dgm:fillClrLst meth="repeat">
+      <a:schemeClr val="lt1">
+        <a:alpha val="90000"/>
+      </a:schemeClr>
+    </dgm:fillClrLst>
+    <dgm:linClrLst>
       <a:schemeClr val="accent1"/>
     </dgm:linClrLst>
     <dgm:effectClrLst/>
@@ -557,14 +806,14 @@
     </dgm:txFillClrLst>
     <dgm:txEffectClrLst/>
   </dgm:styleLbl>
-  <dgm:styleLbl name="conFgAcc1">
+  <dgm:styleLbl name="fgAcc4">
     <dgm:fillClrLst meth="repeat">
       <a:schemeClr val="lt1">
         <a:alpha val="90000"/>
       </a:schemeClr>
     </dgm:fillClrLst>
-    <dgm:linClrLst meth="repeat">
-      <a:schemeClr val="accent1"/>
+    <dgm:linClrLst>
+      <a:schemeClr val="accent2"/>
     </dgm:linClrLst>
     <dgm:effectClrLst/>
     <dgm:txLinClrLst/>
@@ -573,14 +822,14 @@
     </dgm:txFillClrLst>
     <dgm:txEffectClrLst/>
   </dgm:styleLbl>
-  <dgm:styleLbl name="alignAcc1">
+  <dgm:styleLbl name="bgShp">
     <dgm:fillClrLst meth="repeat">
-      <a:schemeClr val="lt1">
-        <a:alpha val="90000"/>
+      <a:schemeClr val="accent5">
+        <a:tint val="40000"/>
       </a:schemeClr>
     </dgm:fillClrLst>
     <dgm:linClrLst meth="repeat">
-      <a:schemeClr val="accent1"/>
+      <a:schemeClr val="dk1"/>
     </dgm:linClrLst>
     <dgm:effectClrLst/>
     <dgm:txLinClrLst/>
@@ -589,228 +838,14 @@
     </dgm:txFillClrLst>
     <dgm:txEffectClrLst/>
   </dgm:styleLbl>
-  <dgm:styleLbl name="trAlignAcc1">
+  <dgm:styleLbl name="dkBgShp">
     <dgm:fillClrLst meth="repeat">
-      <a:schemeClr val="lt1">
-        <a:alpha val="40000"/>
+      <a:schemeClr val="accent5">
+        <a:shade val="90000"/>
       </a:schemeClr>
     </dgm:fillClrLst>
     <dgm:linClrLst meth="repeat">
-      <a:schemeClr val="accent1"/>
-    </dgm:linClrLst>
-    <dgm:effectClrLst/>
-    <dgm:txLinClrLst/>
-    <dgm:txFillClrLst meth="repeat">
       <a:schemeClr val="dk1"/>
-    </dgm:txFillClrLst>
-    <dgm:txEffectClrLst/>
-  </dgm:styleLbl>
-  <dgm:styleLbl name="bgAcc1">
-    <dgm:fillClrLst meth="repeat">
-      <a:schemeClr val="lt1">
-        <a:alpha val="90000"/>
-      </a:schemeClr>
-    </dgm:fillClrLst>
-    <dgm:linClrLst meth="repeat">
-      <a:schemeClr val="accent1"/>
-    </dgm:linClrLst>
-    <dgm:effectClrLst/>
-    <dgm:txLinClrLst/>
-    <dgm:txFillClrLst meth="repeat">
-      <a:schemeClr val="dk1"/>
-    </dgm:txFillClrLst>
-    <dgm:txEffectClrLst/>
-  </dgm:styleLbl>
-  <dgm:styleLbl name="solidFgAcc1">
-    <dgm:fillClrLst meth="repeat">
-      <a:schemeClr val="lt1"/>
-    </dgm:fillClrLst>
-    <dgm:linClrLst meth="repeat">
-      <a:schemeClr val="accent1"/>
-    </dgm:linClrLst>
-    <dgm:effectClrLst/>
-    <dgm:txLinClrLst/>
-    <dgm:txFillClrLst meth="repeat">
-      <a:schemeClr val="dk1"/>
-    </dgm:txFillClrLst>
-    <dgm:txEffectClrLst/>
-  </dgm:styleLbl>
-  <dgm:styleLbl name="solidAlignAcc1">
-    <dgm:fillClrLst meth="repeat">
-      <a:schemeClr val="lt1"/>
-    </dgm:fillClrLst>
-    <dgm:linClrLst meth="repeat">
-      <a:schemeClr val="accent1"/>
-    </dgm:linClrLst>
-    <dgm:effectClrLst/>
-    <dgm:txLinClrLst/>
-    <dgm:txFillClrLst meth="repeat">
-      <a:schemeClr val="dk1"/>
-    </dgm:txFillClrLst>
-    <dgm:txEffectClrLst/>
-  </dgm:styleLbl>
-  <dgm:styleLbl name="solidBgAcc1">
-    <dgm:fillClrLst meth="repeat">
-      <a:schemeClr val="lt1"/>
-    </dgm:fillClrLst>
-    <dgm:linClrLst meth="repeat">
-      <a:schemeClr val="accent1"/>
-    </dgm:linClrLst>
-    <dgm:effectClrLst/>
-    <dgm:txLinClrLst/>
-    <dgm:txFillClrLst meth="repeat">
-      <a:schemeClr val="dk1"/>
-    </dgm:txFillClrLst>
-    <dgm:txEffectClrLst/>
-  </dgm:styleLbl>
-  <dgm:styleLbl name="fgAccFollowNode1">
-    <dgm:fillClrLst meth="repeat">
-      <a:schemeClr val="accent1">
-        <a:alpha val="90000"/>
-        <a:tint val="40000"/>
-      </a:schemeClr>
-    </dgm:fillClrLst>
-    <dgm:linClrLst meth="repeat">
-      <a:schemeClr val="accent1">
-        <a:alpha val="90000"/>
-        <a:tint val="40000"/>
-      </a:schemeClr>
-    </dgm:linClrLst>
-    <dgm:effectClrLst/>
-    <dgm:txLinClrLst/>
-    <dgm:txFillClrLst meth="repeat">
-      <a:schemeClr val="dk1"/>
-    </dgm:txFillClrLst>
-    <dgm:txEffectClrLst/>
-  </dgm:styleLbl>
-  <dgm:styleLbl name="alignAccFollowNode1">
-    <dgm:fillClrLst meth="repeat">
-      <a:schemeClr val="accent1">
-        <a:alpha val="90000"/>
-        <a:tint val="40000"/>
-      </a:schemeClr>
-    </dgm:fillClrLst>
-    <dgm:linClrLst meth="repeat">
-      <a:schemeClr val="accent1">
-        <a:alpha val="90000"/>
-        <a:tint val="40000"/>
-      </a:schemeClr>
-    </dgm:linClrLst>
-    <dgm:effectClrLst/>
-    <dgm:txLinClrLst/>
-    <dgm:txFillClrLst meth="repeat">
-      <a:schemeClr val="dk1"/>
-    </dgm:txFillClrLst>
-    <dgm:txEffectClrLst/>
-  </dgm:styleLbl>
-  <dgm:styleLbl name="bgAccFollowNode1">
-    <dgm:fillClrLst meth="repeat">
-      <a:schemeClr val="accent1">
-        <a:alpha val="90000"/>
-        <a:tint val="40000"/>
-      </a:schemeClr>
-    </dgm:fillClrLst>
-    <dgm:linClrLst meth="repeat">
-      <a:schemeClr val="accent1">
-        <a:alpha val="90000"/>
-        <a:tint val="40000"/>
-      </a:schemeClr>
-    </dgm:linClrLst>
-    <dgm:effectClrLst/>
-    <dgm:txLinClrLst/>
-    <dgm:txFillClrLst meth="repeat">
-      <a:schemeClr val="dk1"/>
-    </dgm:txFillClrLst>
-    <dgm:txEffectClrLst/>
-  </dgm:styleLbl>
-  <dgm:styleLbl name="fgAcc0">
-    <dgm:fillClrLst meth="repeat">
-      <a:schemeClr val="lt1">
-        <a:alpha val="90000"/>
-      </a:schemeClr>
-    </dgm:fillClrLst>
-    <dgm:linClrLst meth="repeat">
-      <a:schemeClr val="accent1"/>
-    </dgm:linClrLst>
-    <dgm:effectClrLst/>
-    <dgm:txLinClrLst/>
-    <dgm:txFillClrLst meth="repeat">
-      <a:schemeClr val="dk1"/>
-    </dgm:txFillClrLst>
-    <dgm:txEffectClrLst/>
-  </dgm:styleLbl>
-  <dgm:styleLbl name="fgAcc2">
-    <dgm:fillClrLst meth="repeat">
-      <a:schemeClr val="lt1">
-        <a:alpha val="90000"/>
-      </a:schemeClr>
-    </dgm:fillClrLst>
-    <dgm:linClrLst meth="repeat">
-      <a:schemeClr val="accent1"/>
-    </dgm:linClrLst>
-    <dgm:effectClrLst/>
-    <dgm:txLinClrLst/>
-    <dgm:txFillClrLst meth="repeat">
-      <a:schemeClr val="dk1"/>
-    </dgm:txFillClrLst>
-    <dgm:txEffectClrLst/>
-  </dgm:styleLbl>
-  <dgm:styleLbl name="fgAcc3">
-    <dgm:fillClrLst meth="repeat">
-      <a:schemeClr val="lt1">
-        <a:alpha val="90000"/>
-      </a:schemeClr>
-    </dgm:fillClrLst>
-    <dgm:linClrLst meth="repeat">
-      <a:schemeClr val="accent1"/>
-    </dgm:linClrLst>
-    <dgm:effectClrLst/>
-    <dgm:txLinClrLst/>
-    <dgm:txFillClrLst meth="repeat">
-      <a:schemeClr val="dk1"/>
-    </dgm:txFillClrLst>
-    <dgm:txEffectClrLst/>
-  </dgm:styleLbl>
-  <dgm:styleLbl name="fgAcc4">
-    <dgm:fillClrLst meth="repeat">
-      <a:schemeClr val="lt1">
-        <a:alpha val="90000"/>
-      </a:schemeClr>
-    </dgm:fillClrLst>
-    <dgm:linClrLst meth="repeat">
-      <a:schemeClr val="accent1"/>
-    </dgm:linClrLst>
-    <dgm:effectClrLst/>
-    <dgm:txLinClrLst/>
-    <dgm:txFillClrLst meth="repeat">
-      <a:schemeClr val="dk1"/>
-    </dgm:txFillClrLst>
-    <dgm:txEffectClrLst/>
-  </dgm:styleLbl>
-  <dgm:styleLbl name="bgShp">
-    <dgm:fillClrLst meth="repeat">
-      <a:schemeClr val="accent1">
-        <a:tint val="40000"/>
-      </a:schemeClr>
-    </dgm:fillClrLst>
-    <dgm:linClrLst meth="repeat">
-      <a:schemeClr val="accent1"/>
-    </dgm:linClrLst>
-    <dgm:effectClrLst/>
-    <dgm:txLinClrLst/>
-    <dgm:txFillClrLst meth="repeat">
-      <a:schemeClr val="dk1"/>
-    </dgm:txFillClrLst>
-    <dgm:txEffectClrLst/>
-  </dgm:styleLbl>
-  <dgm:styleLbl name="dkBgShp">
-    <dgm:fillClrLst meth="repeat">
-      <a:schemeClr val="accent1">
-        <a:shade val="80000"/>
-      </a:schemeClr>
-    </dgm:fillClrLst>
-    <dgm:linClrLst meth="repeat">
-      <a:schemeClr val="accent1"/>
     </dgm:linClrLst>
     <dgm:effectClrLst/>
     <dgm:txLinClrLst/>
@@ -821,13 +856,13 @@
   </dgm:styleLbl>
   <dgm:styleLbl name="trBgShp">
     <dgm:fillClrLst meth="repeat">
-      <a:schemeClr val="accent1">
+      <a:schemeClr val="accent5">
         <a:tint val="50000"/>
         <a:alpha val="40000"/>
       </a:schemeClr>
     </dgm:fillClrLst>
     <dgm:linClrLst meth="repeat">
-      <a:schemeClr val="accent1"/>
+      <a:schemeClr val="accent5"/>
     </dgm:linClrLst>
     <dgm:effectClrLst/>
     <dgm:txLinClrLst/>
@@ -838,8 +873,8 @@
   </dgm:styleLbl>
   <dgm:styleLbl name="fgShp">
     <dgm:fillClrLst meth="repeat">
-      <a:schemeClr val="accent1">
-        <a:tint val="60000"/>
+      <a:schemeClr val="accent5">
+        <a:tint val="40000"/>
       </a:schemeClr>
     </dgm:fillClrLst>
     <dgm:linClrLst meth="repeat">
@@ -876,8 +911,8 @@
 <file path=ppt/diagrams/data1.xml><?xml version="1.0" encoding="utf-8"?>
 <dgm:dataModel xmlns:dgm="http://schemas.openxmlformats.org/drawingml/2006/diagram" xmlns:a="http://schemas.openxmlformats.org/drawingml/2006/main">
   <dgm:ptLst>
-    <dgm:pt modelId="{C4E624E6-7EE8-4626-9DBF-59652570CB53}" type="doc">
-      <dgm:prSet loTypeId="urn:microsoft.com/office/officeart/2005/8/layout/vList5" loCatId="list" qsTypeId="urn:microsoft.com/office/officeart/2005/8/quickstyle/simple1" qsCatId="simple" csTypeId="urn:microsoft.com/office/officeart/2005/8/colors/accent1_2" csCatId="accent1" phldr="1"/>
+    <dgm:pt modelId="{B3297E59-6DA5-45C8-B2C9-C4B1CEF1412D}" type="doc">
+      <dgm:prSet loTypeId="urn:microsoft.com/office/officeart/2005/8/layout/process4" loCatId="list" qsTypeId="urn:microsoft.com/office/officeart/2005/8/quickstyle/simple3" qsCatId="simple" csTypeId="urn:microsoft.com/office/officeart/2005/8/colors/colorful5" csCatId="colorful" phldr="1"/>
       <dgm:spPr/>
       <dgm:t>
         <a:bodyPr/>
@@ -887,7 +922,7 @@
         </a:p>
       </dgm:t>
     </dgm:pt>
-    <dgm:pt modelId="{A0D6FE84-7B96-4511-B001-B07FDC9715FF}">
+    <dgm:pt modelId="{312FC55F-C8EC-4236-91D6-C096342C0EC8}">
       <dgm:prSet phldrT="[Text]" custT="1"/>
       <dgm:spPr/>
       <dgm:t>
@@ -895,7 +930,7 @@
         <a:lstStyle/>
         <a:p>
           <a:r>
-            <a:rPr lang="en-US" sz="3600" b="1" dirty="0">
+            <a:rPr lang="en-US" sz="4800" b="1" dirty="0">
               <a:latin typeface="Arial" panose="020B0604020202020204" pitchFamily="34" charset="0"/>
               <a:cs typeface="Arial" panose="020B0604020202020204" pitchFamily="34" charset="0"/>
             </a:rPr>
@@ -904,7 +939,7 @@
         </a:p>
       </dgm:t>
     </dgm:pt>
-    <dgm:pt modelId="{13B923C7-2DCD-4B49-801A-BFC2936F8626}" type="parTrans" cxnId="{704AA35B-C053-4FC2-AF39-7357CFB51BD6}">
+    <dgm:pt modelId="{757A04A3-4354-450D-923E-86ACABF094D8}" type="parTrans" cxnId="{F7D6E620-11D4-45B9-BAF3-CA4609AE3F83}">
       <dgm:prSet/>
       <dgm:spPr/>
       <dgm:t>
@@ -915,7 +950,7 @@
         </a:p>
       </dgm:t>
     </dgm:pt>
-    <dgm:pt modelId="{BBF7128E-C149-4147-869B-F49F619B247E}" type="sibTrans" cxnId="{704AA35B-C053-4FC2-AF39-7357CFB51BD6}">
+    <dgm:pt modelId="{156433CE-2964-4787-8F84-6E55B064D28D}" type="sibTrans" cxnId="{F7D6E620-11D4-45B9-BAF3-CA4609AE3F83}">
       <dgm:prSet/>
       <dgm:spPr/>
       <dgm:t>
@@ -926,18 +961,24 @@
         </a:p>
       </dgm:t>
     </dgm:pt>
-    <dgm:pt modelId="{41FA6E83-8B5B-438F-9105-203A95B83EF7}">
-      <dgm:prSet phldrT="[Text]" phldr="1"/>
+    <dgm:pt modelId="{65FC19AF-04F6-46DE-BC5B-71F205C01195}">
+      <dgm:prSet phldrT="[Text]" custT="1"/>
       <dgm:spPr/>
       <dgm:t>
         <a:bodyPr/>
         <a:lstStyle/>
         <a:p>
-          <a:endParaRPr lang="en-US"/>
+          <a:r>
+            <a:rPr lang="en-US" sz="3600" dirty="0">
+              <a:latin typeface="Arial" panose="020B0604020202020204" pitchFamily="34" charset="0"/>
+              <a:cs typeface="Arial" panose="020B0604020202020204" pitchFamily="34" charset="0"/>
+            </a:rPr>
+            <a:t>Blah</a:t>
+          </a:r>
         </a:p>
       </dgm:t>
     </dgm:pt>
-    <dgm:pt modelId="{7657B5B8-8401-47E3-A864-C466DED310D4}" type="parTrans" cxnId="{040997B2-35FB-4106-B5DD-08BE9B102EDD}">
+    <dgm:pt modelId="{50B99C99-5414-4CA3-8CDB-D2BC7449D522}" type="parTrans" cxnId="{A1E8DEA4-00A3-46EE-918C-E8087A6B3211}">
       <dgm:prSet/>
       <dgm:spPr/>
       <dgm:t>
@@ -948,7 +989,7 @@
         </a:p>
       </dgm:t>
     </dgm:pt>
-    <dgm:pt modelId="{87F03554-B732-4AB1-BE9D-FADA321B4E6D}" type="sibTrans" cxnId="{040997B2-35FB-4106-B5DD-08BE9B102EDD}">
+    <dgm:pt modelId="{D2B16A81-6FB3-43EA-B537-A4B0236BA3FC}" type="sibTrans" cxnId="{A1E8DEA4-00A3-46EE-918C-E8087A6B3211}">
       <dgm:prSet/>
       <dgm:spPr/>
       <dgm:t>
@@ -959,18 +1000,24 @@
         </a:p>
       </dgm:t>
     </dgm:pt>
-    <dgm:pt modelId="{48E59DE2-45BF-46DC-970E-3590464F8F08}">
-      <dgm:prSet phldrT="[Text]" phldr="1"/>
+    <dgm:pt modelId="{4722B5D1-9FF0-444E-AF05-B7943FECADFD}">
+      <dgm:prSet phldrT="[Text]" custT="1"/>
       <dgm:spPr/>
       <dgm:t>
         <a:bodyPr/>
         <a:lstStyle/>
         <a:p>
-          <a:endParaRPr lang="en-US"/>
+          <a:r>
+            <a:rPr lang="en-US" sz="4800" b="1" dirty="0">
+              <a:latin typeface="Arial" panose="020B0604020202020204" pitchFamily="34" charset="0"/>
+              <a:cs typeface="Arial" panose="020B0604020202020204" pitchFamily="34" charset="0"/>
+            </a:rPr>
+            <a:t>Testing</a:t>
+          </a:r>
         </a:p>
       </dgm:t>
     </dgm:pt>
-    <dgm:pt modelId="{F37E9B3B-FED2-427E-901D-561509146EA1}" type="parTrans" cxnId="{85971C69-9AD9-40D1-82BA-1A66B6B301CF}">
+    <dgm:pt modelId="{D2F20A7C-AF17-4B98-A388-89CA45439743}" type="parTrans" cxnId="{EA8DEB26-3F8C-4C7D-8657-208B190F7BCC}">
       <dgm:prSet/>
       <dgm:spPr/>
       <dgm:t>
@@ -981,7 +1028,7 @@
         </a:p>
       </dgm:t>
     </dgm:pt>
-    <dgm:pt modelId="{85D544F8-13F2-4317-BE7F-59AE18B3C859}" type="sibTrans" cxnId="{85971C69-9AD9-40D1-82BA-1A66B6B301CF}">
+    <dgm:pt modelId="{03566995-9E32-45AF-A06F-87B00806B47E}" type="sibTrans" cxnId="{EA8DEB26-3F8C-4C7D-8657-208B190F7BCC}">
       <dgm:prSet/>
       <dgm:spPr/>
       <dgm:t>
@@ -992,24 +1039,21 @@
         </a:p>
       </dgm:t>
     </dgm:pt>
-    <dgm:pt modelId="{8F594DC0-072E-48CE-8E67-38979C3D1DA0}">
-      <dgm:prSet phldrT="[Text]" custT="1"/>
+    <dgm:pt modelId="{5E3ACCA9-2237-4591-8390-E87DDEF273D6}">
+      <dgm:prSet phldrT="[Text]" phldr="1" custT="1"/>
       <dgm:spPr/>
       <dgm:t>
         <a:bodyPr/>
         <a:lstStyle/>
         <a:p>
-          <a:r>
-            <a:rPr lang="en-US" sz="3600" b="1" dirty="0">
-              <a:latin typeface="Arial" panose="020B0604020202020204" pitchFamily="34" charset="0"/>
-              <a:cs typeface="Arial" panose="020B0604020202020204" pitchFamily="34" charset="0"/>
-            </a:rPr>
-            <a:t>Testing</a:t>
-          </a:r>
+          <a:endParaRPr lang="en-US" sz="3600" dirty="0">
+            <a:latin typeface="Arial" panose="020B0604020202020204" pitchFamily="34" charset="0"/>
+            <a:cs typeface="Arial" panose="020B0604020202020204" pitchFamily="34" charset="0"/>
+          </a:endParaRPr>
         </a:p>
       </dgm:t>
     </dgm:pt>
-    <dgm:pt modelId="{70338DBF-2333-46FA-9980-86ED0EB3763F}" type="parTrans" cxnId="{E122B339-32C9-475D-9DE9-0A948C0D9E22}">
+    <dgm:pt modelId="{6DA72908-207A-414A-9F64-579824D3D6B1}" type="parTrans" cxnId="{2B96D320-E745-4E67-9E81-59189C0DBB37}">
       <dgm:prSet/>
       <dgm:spPr/>
       <dgm:t>
@@ -1020,7 +1064,7 @@
         </a:p>
       </dgm:t>
     </dgm:pt>
-    <dgm:pt modelId="{DF728DEA-83E0-42DB-BC8C-995386EFB150}" type="sibTrans" cxnId="{E122B339-32C9-475D-9DE9-0A948C0D9E22}">
+    <dgm:pt modelId="{4017227C-8243-4F71-B212-0C3D9ED43B2D}" type="sibTrans" cxnId="{2B96D320-E745-4E67-9E81-59189C0DBB37}">
       <dgm:prSet/>
       <dgm:spPr/>
       <dgm:t>
@@ -1031,18 +1075,24 @@
         </a:p>
       </dgm:t>
     </dgm:pt>
-    <dgm:pt modelId="{94ED591F-654C-4649-8DB6-C1D5B7A7A9C4}">
-      <dgm:prSet phldrT="[Text]" phldr="1"/>
+    <dgm:pt modelId="{DFFD45AC-626D-4E41-9B27-07A739F3C383}">
+      <dgm:prSet phldrT="[Text]" custT="1"/>
       <dgm:spPr/>
       <dgm:t>
         <a:bodyPr/>
         <a:lstStyle/>
         <a:p>
-          <a:endParaRPr lang="en-US"/>
+          <a:r>
+            <a:rPr lang="en-US" sz="4800" b="1" dirty="0">
+              <a:latin typeface="Arial" panose="020B0604020202020204" pitchFamily="34" charset="0"/>
+              <a:cs typeface="Arial" panose="020B0604020202020204" pitchFamily="34" charset="0"/>
+            </a:rPr>
+            <a:t>Implementation</a:t>
+          </a:r>
         </a:p>
       </dgm:t>
     </dgm:pt>
-    <dgm:pt modelId="{100C3872-B351-4745-B40F-E311A6FED7C3}" type="parTrans" cxnId="{D2561C62-9A77-4C0B-984A-23900D558B4C}">
+    <dgm:pt modelId="{314EAE01-F735-45EB-AE52-6BBC49069134}" type="parTrans" cxnId="{2B7217A0-9F30-4007-88E0-4AAD824C14E7}">
       <dgm:prSet/>
       <dgm:spPr/>
       <dgm:t>
@@ -1053,7 +1103,7 @@
         </a:p>
       </dgm:t>
     </dgm:pt>
-    <dgm:pt modelId="{26C96A6A-439E-4869-890C-CFF60B37D5AD}" type="sibTrans" cxnId="{D2561C62-9A77-4C0B-984A-23900D558B4C}">
+    <dgm:pt modelId="{72687876-7EFE-45BA-9E57-350D05F60F37}" type="sibTrans" cxnId="{2B7217A0-9F30-4007-88E0-4AAD824C14E7}">
       <dgm:prSet/>
       <dgm:spPr/>
       <dgm:t>
@@ -1064,18 +1114,21 @@
         </a:p>
       </dgm:t>
     </dgm:pt>
-    <dgm:pt modelId="{EAD4C05B-1C20-44A7-9D5E-60FC68FF9561}">
-      <dgm:prSet phldrT="[Text]" phldr="1"/>
+    <dgm:pt modelId="{215713E1-4C04-41C7-9E5C-94892B7BDC85}">
+      <dgm:prSet phldrT="[Text]" phldr="1" custT="1"/>
       <dgm:spPr/>
       <dgm:t>
         <a:bodyPr/>
         <a:lstStyle/>
         <a:p>
-          <a:endParaRPr lang="en-US"/>
+          <a:endParaRPr lang="en-US" sz="3600" dirty="0">
+            <a:latin typeface="Arial" panose="020B0604020202020204" pitchFamily="34" charset="0"/>
+            <a:cs typeface="Arial" panose="020B0604020202020204" pitchFamily="34" charset="0"/>
+          </a:endParaRPr>
         </a:p>
       </dgm:t>
     </dgm:pt>
-    <dgm:pt modelId="{91BC3865-643F-4473-B379-7899940EEBCC}" type="parTrans" cxnId="{40D5F0FC-A461-4CCA-A8ED-6572B5B67F10}">
+    <dgm:pt modelId="{BD79C9B6-9775-4105-8001-33D964573641}" type="parTrans" cxnId="{7D126E4D-142E-4FAB-93FD-8E384D9697F2}">
       <dgm:prSet/>
       <dgm:spPr/>
       <dgm:t>
@@ -1086,7 +1139,7 @@
         </a:p>
       </dgm:t>
     </dgm:pt>
-    <dgm:pt modelId="{1754BF92-40B1-4AD8-8C32-CE41B54A4AF5}" type="sibTrans" cxnId="{40D5F0FC-A461-4CCA-A8ED-6572B5B67F10}">
+    <dgm:pt modelId="{8FEA6871-B997-4B93-A30C-C6485122EB62}" type="sibTrans" cxnId="{7D126E4D-142E-4FAB-93FD-8E384D9697F2}">
       <dgm:prSet/>
       <dgm:spPr/>
       <dgm:t>
@@ -1097,113 +1150,8 @@
         </a:p>
       </dgm:t>
     </dgm:pt>
-    <dgm:pt modelId="{1A801C81-36B3-4EA5-A891-45165DAED9A9}">
-      <dgm:prSet phldrT="[Text]" custT="1"/>
-      <dgm:spPr/>
-      <dgm:t>
-        <a:bodyPr/>
-        <a:lstStyle/>
-        <a:p>
-          <a:r>
-            <a:rPr lang="en-US" sz="3600" b="1" dirty="0">
-              <a:latin typeface="Arial" panose="020B0604020202020204" pitchFamily="34" charset="0"/>
-              <a:cs typeface="Arial" panose="020B0604020202020204" pitchFamily="34" charset="0"/>
-            </a:rPr>
-            <a:t>Integration</a:t>
-          </a:r>
-        </a:p>
-      </dgm:t>
-    </dgm:pt>
-    <dgm:pt modelId="{53F428A2-3374-4BCF-B2B7-CAD0C4913703}" type="parTrans" cxnId="{BA2A42AB-5131-4D71-A1F4-F2CD7566B4CC}">
-      <dgm:prSet/>
-      <dgm:spPr/>
-      <dgm:t>
-        <a:bodyPr/>
-        <a:lstStyle/>
-        <a:p>
-          <a:endParaRPr lang="en-US"/>
-        </a:p>
-      </dgm:t>
-    </dgm:pt>
-    <dgm:pt modelId="{36C475DB-2B1E-423F-BBF7-86655BD2C6AC}" type="sibTrans" cxnId="{BA2A42AB-5131-4D71-A1F4-F2CD7566B4CC}">
-      <dgm:prSet/>
-      <dgm:spPr/>
-      <dgm:t>
-        <a:bodyPr/>
-        <a:lstStyle/>
-        <a:p>
-          <a:endParaRPr lang="en-US"/>
-        </a:p>
-      </dgm:t>
-    </dgm:pt>
-    <dgm:pt modelId="{4BC9C05A-DBD6-4992-880D-8D4A72F937E3}">
-      <dgm:prSet phldrT="[Text]" phldr="1"/>
-      <dgm:spPr/>
-      <dgm:t>
-        <a:bodyPr/>
-        <a:lstStyle/>
-        <a:p>
-          <a:endParaRPr lang="en-US"/>
-        </a:p>
-      </dgm:t>
-    </dgm:pt>
-    <dgm:pt modelId="{401F01DA-6E34-4DF4-97E2-8EE9C554AA7B}" type="parTrans" cxnId="{8F6B4834-0544-4B5B-BDC7-2F5FFC386DA5}">
-      <dgm:prSet/>
-      <dgm:spPr/>
-      <dgm:t>
-        <a:bodyPr/>
-        <a:lstStyle/>
-        <a:p>
-          <a:endParaRPr lang="en-US"/>
-        </a:p>
-      </dgm:t>
-    </dgm:pt>
-    <dgm:pt modelId="{56C3DAA9-7EA2-419E-84AB-0E5D339A8FBA}" type="sibTrans" cxnId="{8F6B4834-0544-4B5B-BDC7-2F5FFC386DA5}">
-      <dgm:prSet/>
-      <dgm:spPr/>
-      <dgm:t>
-        <a:bodyPr/>
-        <a:lstStyle/>
-        <a:p>
-          <a:endParaRPr lang="en-US"/>
-        </a:p>
-      </dgm:t>
-    </dgm:pt>
-    <dgm:pt modelId="{7EE7A580-9AB2-4FEA-910F-F272501A77AE}">
-      <dgm:prSet phldrT="[Text]" phldr="1"/>
-      <dgm:spPr/>
-      <dgm:t>
-        <a:bodyPr/>
-        <a:lstStyle/>
-        <a:p>
-          <a:endParaRPr lang="en-US"/>
-        </a:p>
-      </dgm:t>
-    </dgm:pt>
-    <dgm:pt modelId="{87CAF21A-6183-4456-BBE8-8927316EB4D8}" type="parTrans" cxnId="{5E7A2130-44EC-406D-A2A6-44987954EA78}">
-      <dgm:prSet/>
-      <dgm:spPr/>
-      <dgm:t>
-        <a:bodyPr/>
-        <a:lstStyle/>
-        <a:p>
-          <a:endParaRPr lang="en-US"/>
-        </a:p>
-      </dgm:t>
-    </dgm:pt>
-    <dgm:pt modelId="{87AEB2CF-CB23-4A32-B6BB-D43023F54558}" type="sibTrans" cxnId="{5E7A2130-44EC-406D-A2A6-44987954EA78}">
-      <dgm:prSet/>
-      <dgm:spPr/>
-      <dgm:t>
-        <a:bodyPr/>
-        <a:lstStyle/>
-        <a:p>
-          <a:endParaRPr lang="en-US"/>
-        </a:p>
-      </dgm:t>
-    </dgm:pt>
-    <dgm:pt modelId="{BFEEC3BD-4037-49A1-8E5D-4FB48F9A9474}" type="pres">
-      <dgm:prSet presAssocID="{C4E624E6-7EE8-4626-9DBF-59652570CB53}" presName="Name0" presStyleCnt="0">
+    <dgm:pt modelId="{83AEFD3F-0FD9-4BE0-9818-0DB3EB5A7ECD}" type="pres">
+      <dgm:prSet presAssocID="{B3297E59-6DA5-45C8-B2C9-C4B1CEF1412D}" presName="Name0" presStyleCnt="0">
         <dgm:presLayoutVars>
           <dgm:dir/>
           <dgm:animLvl val="lvl"/>
@@ -1212,71 +1160,80 @@
       </dgm:prSet>
       <dgm:spPr/>
     </dgm:pt>
-    <dgm:pt modelId="{B3F9DBAD-3C6F-413E-81D4-58BD1A3BFC8A}" type="pres">
-      <dgm:prSet presAssocID="{A0D6FE84-7B96-4511-B001-B07FDC9715FF}" presName="linNode" presStyleCnt="0"/>
+    <dgm:pt modelId="{81153C38-2826-4A1D-BCC4-BAA2CC1D28F5}" type="pres">
+      <dgm:prSet presAssocID="{DFFD45AC-626D-4E41-9B27-07A739F3C383}" presName="boxAndChildren" presStyleCnt="0"/>
       <dgm:spPr/>
     </dgm:pt>
-    <dgm:pt modelId="{742ACACF-A2C7-48EC-BC50-F15928E3EA9A}" type="pres">
-      <dgm:prSet presAssocID="{A0D6FE84-7B96-4511-B001-B07FDC9715FF}" presName="parentText" presStyleLbl="node1" presStyleIdx="0" presStyleCnt="3" custScaleX="115114">
-        <dgm:presLayoutVars>
-          <dgm:chMax val="1"/>
-          <dgm:bulletEnabled val="1"/>
-        </dgm:presLayoutVars>
-      </dgm:prSet>
+    <dgm:pt modelId="{37FF7C4A-9C6A-4008-A3B9-DBE4EA1B5698}" type="pres">
+      <dgm:prSet presAssocID="{DFFD45AC-626D-4E41-9B27-07A739F3C383}" presName="parentTextBox" presStyleLbl="node1" presStyleIdx="0" presStyleCnt="3"/>
       <dgm:spPr/>
     </dgm:pt>
-    <dgm:pt modelId="{8089D171-B2EA-4876-B2DC-F47766FE2B67}" type="pres">
-      <dgm:prSet presAssocID="{A0D6FE84-7B96-4511-B001-B07FDC9715FF}" presName="descendantText" presStyleLbl="alignAccFollowNode1" presStyleIdx="0" presStyleCnt="3" custScaleX="86106">
+    <dgm:pt modelId="{225B9DA5-AE1E-4AFC-A6B8-3D89FECB5DE3}" type="pres">
+      <dgm:prSet presAssocID="{DFFD45AC-626D-4E41-9B27-07A739F3C383}" presName="entireBox" presStyleLbl="node1" presStyleIdx="0" presStyleCnt="3"/>
+      <dgm:spPr/>
+    </dgm:pt>
+    <dgm:pt modelId="{9864DB20-2EE5-45B9-B12F-90BEA364222E}" type="pres">
+      <dgm:prSet presAssocID="{DFFD45AC-626D-4E41-9B27-07A739F3C383}" presName="descendantBox" presStyleCnt="0"/>
+      <dgm:spPr/>
+    </dgm:pt>
+    <dgm:pt modelId="{65BDF7AF-96A0-4C52-A2C4-AB54A8D8FC7E}" type="pres">
+      <dgm:prSet presAssocID="{215713E1-4C04-41C7-9E5C-94892B7BDC85}" presName="childTextBox" presStyleLbl="fgAccFollowNode1" presStyleIdx="0" presStyleCnt="3">
         <dgm:presLayoutVars>
           <dgm:bulletEnabled val="1"/>
         </dgm:presLayoutVars>
       </dgm:prSet>
       <dgm:spPr/>
     </dgm:pt>
-    <dgm:pt modelId="{EF42EC5D-61C5-49AD-AA55-75F3B485BF72}" type="pres">
-      <dgm:prSet presAssocID="{BBF7128E-C149-4147-869B-F49F619B247E}" presName="sp" presStyleCnt="0"/>
+    <dgm:pt modelId="{3FBB3A37-3356-45BF-BC28-FD744F603313}" type="pres">
+      <dgm:prSet presAssocID="{03566995-9E32-45AF-A06F-87B00806B47E}" presName="sp" presStyleCnt="0"/>
       <dgm:spPr/>
     </dgm:pt>
-    <dgm:pt modelId="{F207A6F3-CA7A-4CFB-BAEB-C656A7022FFD}" type="pres">
-      <dgm:prSet presAssocID="{8F594DC0-072E-48CE-8E67-38979C3D1DA0}" presName="linNode" presStyleCnt="0"/>
+    <dgm:pt modelId="{A396EFE2-4F1C-487A-833B-BE61160A9D12}" type="pres">
+      <dgm:prSet presAssocID="{4722B5D1-9FF0-444E-AF05-B7943FECADFD}" presName="arrowAndChildren" presStyleCnt="0"/>
       <dgm:spPr/>
     </dgm:pt>
-    <dgm:pt modelId="{F6432572-6B47-455C-90F0-85992BA31D09}" type="pres">
-      <dgm:prSet presAssocID="{8F594DC0-072E-48CE-8E67-38979C3D1DA0}" presName="parentText" presStyleLbl="node1" presStyleIdx="1" presStyleCnt="3" custScaleX="108884">
-        <dgm:presLayoutVars>
-          <dgm:chMax val="1"/>
-          <dgm:bulletEnabled val="1"/>
-        </dgm:presLayoutVars>
-      </dgm:prSet>
+    <dgm:pt modelId="{A6C45478-8621-4E77-840B-0E960EBEB81A}" type="pres">
+      <dgm:prSet presAssocID="{4722B5D1-9FF0-444E-AF05-B7943FECADFD}" presName="parentTextArrow" presStyleLbl="node1" presStyleIdx="0" presStyleCnt="3"/>
       <dgm:spPr/>
     </dgm:pt>
-    <dgm:pt modelId="{4A097E5D-8C80-464D-977D-A4FDFBB9A45F}" type="pres">
-      <dgm:prSet presAssocID="{8F594DC0-072E-48CE-8E67-38979C3D1DA0}" presName="descendantText" presStyleLbl="alignAccFollowNode1" presStyleIdx="1" presStyleCnt="3">
+    <dgm:pt modelId="{10B9B615-8A0E-4958-B02C-FAE03CECEEAC}" type="pres">
+      <dgm:prSet presAssocID="{4722B5D1-9FF0-444E-AF05-B7943FECADFD}" presName="arrow" presStyleLbl="node1" presStyleIdx="1" presStyleCnt="3"/>
+      <dgm:spPr/>
+    </dgm:pt>
+    <dgm:pt modelId="{3A405396-3D1B-4F71-8999-6CA4CFB5E1D5}" type="pres">
+      <dgm:prSet presAssocID="{4722B5D1-9FF0-444E-AF05-B7943FECADFD}" presName="descendantArrow" presStyleCnt="0"/>
+      <dgm:spPr/>
+    </dgm:pt>
+    <dgm:pt modelId="{17CE8A2C-DAB6-40B3-9A36-CF46C38A431C}" type="pres">
+      <dgm:prSet presAssocID="{5E3ACCA9-2237-4591-8390-E87DDEF273D6}" presName="childTextArrow" presStyleLbl="fgAccFollowNode1" presStyleIdx="1" presStyleCnt="3">
         <dgm:presLayoutVars>
           <dgm:bulletEnabled val="1"/>
         </dgm:presLayoutVars>
       </dgm:prSet>
       <dgm:spPr/>
     </dgm:pt>
-    <dgm:pt modelId="{66AEE38D-044A-497A-B218-57FDF524E74D}" type="pres">
-      <dgm:prSet presAssocID="{DF728DEA-83E0-42DB-BC8C-995386EFB150}" presName="sp" presStyleCnt="0"/>
+    <dgm:pt modelId="{86346703-73F4-47CE-8A88-540E118505EE}" type="pres">
+      <dgm:prSet presAssocID="{156433CE-2964-4787-8F84-6E55B064D28D}" presName="sp" presStyleCnt="0"/>
       <dgm:spPr/>
     </dgm:pt>
-    <dgm:pt modelId="{C5F2274C-7215-4CA9-A0A1-59220A914D4F}" type="pres">
-      <dgm:prSet presAssocID="{1A801C81-36B3-4EA5-A891-45165DAED9A9}" presName="linNode" presStyleCnt="0"/>
+    <dgm:pt modelId="{CF594111-B284-449B-8044-D2D846889A56}" type="pres">
+      <dgm:prSet presAssocID="{312FC55F-C8EC-4236-91D6-C096342C0EC8}" presName="arrowAndChildren" presStyleCnt="0"/>
       <dgm:spPr/>
     </dgm:pt>
-    <dgm:pt modelId="{D9D9AC0A-1C2F-4BC9-A636-BF56F10002C7}" type="pres">
-      <dgm:prSet presAssocID="{1A801C81-36B3-4EA5-A891-45165DAED9A9}" presName="parentText" presStyleLbl="node1" presStyleIdx="2" presStyleCnt="3">
-        <dgm:presLayoutVars>
-          <dgm:chMax val="1"/>
-          <dgm:bulletEnabled val="1"/>
-        </dgm:presLayoutVars>
-      </dgm:prSet>
+    <dgm:pt modelId="{DA130E29-39F2-4721-8434-F50BAED697F4}" type="pres">
+      <dgm:prSet presAssocID="{312FC55F-C8EC-4236-91D6-C096342C0EC8}" presName="parentTextArrow" presStyleLbl="node1" presStyleIdx="1" presStyleCnt="3"/>
       <dgm:spPr/>
     </dgm:pt>
-    <dgm:pt modelId="{73141C27-ECF7-4935-80E8-B24174A7125B}" type="pres">
-      <dgm:prSet presAssocID="{1A801C81-36B3-4EA5-A891-45165DAED9A9}" presName="descendantText" presStyleLbl="alignAccFollowNode1" presStyleIdx="2" presStyleCnt="3">
+    <dgm:pt modelId="{7A66EA75-20C4-4DA4-B911-4734A325BE93}" type="pres">
+      <dgm:prSet presAssocID="{312FC55F-C8EC-4236-91D6-C096342C0EC8}" presName="arrow" presStyleLbl="node1" presStyleIdx="2" presStyleCnt="3" custLinFactX="14270" custLinFactY="-4466" custLinFactNeighborX="100000" custLinFactNeighborY="-100000"/>
+      <dgm:spPr/>
+    </dgm:pt>
+    <dgm:pt modelId="{D91002B0-61BD-416C-A52E-BED94AB27CF1}" type="pres">
+      <dgm:prSet presAssocID="{312FC55F-C8EC-4236-91D6-C096342C0EC8}" presName="descendantArrow" presStyleCnt="0"/>
+      <dgm:spPr/>
+    </dgm:pt>
+    <dgm:pt modelId="{A760AF50-E3AE-48AD-A67C-C55D3B059B12}" type="pres">
+      <dgm:prSet presAssocID="{65FC19AF-04F6-46DE-BC5B-71F205C01195}" presName="childTextArrow" presStyleLbl="fgAccFollowNode1" presStyleIdx="2" presStyleCnt="3">
         <dgm:presLayoutVars>
           <dgm:bulletEnabled val="1"/>
         </dgm:presLayoutVars>
@@ -1285,36 +1242,39 @@
     </dgm:pt>
   </dgm:ptLst>
   <dgm:cxnLst>
-    <dgm:cxn modelId="{0F4EDC18-6663-4C70-A731-5C951AB4B739}" type="presOf" srcId="{48E59DE2-45BF-46DC-970E-3590464F8F08}" destId="{8089D171-B2EA-4876-B2DC-F47766FE2B67}" srcOrd="0" destOrd="1" presId="urn:microsoft.com/office/officeart/2005/8/layout/vList5"/>
-    <dgm:cxn modelId="{94FE401D-B882-4903-BD3B-71C01113951B}" type="presOf" srcId="{7EE7A580-9AB2-4FEA-910F-F272501A77AE}" destId="{73141C27-ECF7-4935-80E8-B24174A7125B}" srcOrd="0" destOrd="1" presId="urn:microsoft.com/office/officeart/2005/8/layout/vList5"/>
-    <dgm:cxn modelId="{B0E4E225-F9BC-4EF5-A3F9-AEBDBC6C1FA0}" type="presOf" srcId="{8F594DC0-072E-48CE-8E67-38979C3D1DA0}" destId="{F6432572-6B47-455C-90F0-85992BA31D09}" srcOrd="0" destOrd="0" presId="urn:microsoft.com/office/officeart/2005/8/layout/vList5"/>
-    <dgm:cxn modelId="{5E7A2130-44EC-406D-A2A6-44987954EA78}" srcId="{1A801C81-36B3-4EA5-A891-45165DAED9A9}" destId="{7EE7A580-9AB2-4FEA-910F-F272501A77AE}" srcOrd="1" destOrd="0" parTransId="{87CAF21A-6183-4456-BBE8-8927316EB4D8}" sibTransId="{87AEB2CF-CB23-4A32-B6BB-D43023F54558}"/>
-    <dgm:cxn modelId="{8F6B4834-0544-4B5B-BDC7-2F5FFC386DA5}" srcId="{1A801C81-36B3-4EA5-A891-45165DAED9A9}" destId="{4BC9C05A-DBD6-4992-880D-8D4A72F937E3}" srcOrd="0" destOrd="0" parTransId="{401F01DA-6E34-4DF4-97E2-8EE9C554AA7B}" sibTransId="{56C3DAA9-7EA2-419E-84AB-0E5D339A8FBA}"/>
-    <dgm:cxn modelId="{E122B339-32C9-475D-9DE9-0A948C0D9E22}" srcId="{C4E624E6-7EE8-4626-9DBF-59652570CB53}" destId="{8F594DC0-072E-48CE-8E67-38979C3D1DA0}" srcOrd="1" destOrd="0" parTransId="{70338DBF-2333-46FA-9980-86ED0EB3763F}" sibTransId="{DF728DEA-83E0-42DB-BC8C-995386EFB150}"/>
-    <dgm:cxn modelId="{704AA35B-C053-4FC2-AF39-7357CFB51BD6}" srcId="{C4E624E6-7EE8-4626-9DBF-59652570CB53}" destId="{A0D6FE84-7B96-4511-B001-B07FDC9715FF}" srcOrd="0" destOrd="0" parTransId="{13B923C7-2DCD-4B49-801A-BFC2936F8626}" sibTransId="{BBF7128E-C149-4147-869B-F49F619B247E}"/>
-    <dgm:cxn modelId="{D2561C62-9A77-4C0B-984A-23900D558B4C}" srcId="{8F594DC0-072E-48CE-8E67-38979C3D1DA0}" destId="{94ED591F-654C-4649-8DB6-C1D5B7A7A9C4}" srcOrd="0" destOrd="0" parTransId="{100C3872-B351-4745-B40F-E311A6FED7C3}" sibTransId="{26C96A6A-439E-4869-890C-CFF60B37D5AD}"/>
-    <dgm:cxn modelId="{85971C69-9AD9-40D1-82BA-1A66B6B301CF}" srcId="{A0D6FE84-7B96-4511-B001-B07FDC9715FF}" destId="{48E59DE2-45BF-46DC-970E-3590464F8F08}" srcOrd="1" destOrd="0" parTransId="{F37E9B3B-FED2-427E-901D-561509146EA1}" sibTransId="{85D544F8-13F2-4317-BE7F-59AE18B3C859}"/>
-    <dgm:cxn modelId="{AE901D4D-CF50-4398-BEDE-EBF325955AD7}" type="presOf" srcId="{C4E624E6-7EE8-4626-9DBF-59652570CB53}" destId="{BFEEC3BD-4037-49A1-8E5D-4FB48F9A9474}" srcOrd="0" destOrd="0" presId="urn:microsoft.com/office/officeart/2005/8/layout/vList5"/>
-    <dgm:cxn modelId="{3D1F5F6F-FAF9-4B08-B228-FEED31CC2694}" type="presOf" srcId="{1A801C81-36B3-4EA5-A891-45165DAED9A9}" destId="{D9D9AC0A-1C2F-4BC9-A636-BF56F10002C7}" srcOrd="0" destOrd="0" presId="urn:microsoft.com/office/officeart/2005/8/layout/vList5"/>
-    <dgm:cxn modelId="{5488AE4F-53C3-4148-9228-74B581980B81}" type="presOf" srcId="{41FA6E83-8B5B-438F-9105-203A95B83EF7}" destId="{8089D171-B2EA-4876-B2DC-F47766FE2B67}" srcOrd="0" destOrd="0" presId="urn:microsoft.com/office/officeart/2005/8/layout/vList5"/>
-    <dgm:cxn modelId="{5484F388-3051-4ACA-96C1-EA895E4ED557}" type="presOf" srcId="{EAD4C05B-1C20-44A7-9D5E-60FC68FF9561}" destId="{4A097E5D-8C80-464D-977D-A4FDFBB9A45F}" srcOrd="0" destOrd="1" presId="urn:microsoft.com/office/officeart/2005/8/layout/vList5"/>
-    <dgm:cxn modelId="{CA0A899E-84D4-4229-A676-B547084291BB}" type="presOf" srcId="{4BC9C05A-DBD6-4992-880D-8D4A72F937E3}" destId="{73141C27-ECF7-4935-80E8-B24174A7125B}" srcOrd="0" destOrd="0" presId="urn:microsoft.com/office/officeart/2005/8/layout/vList5"/>
-    <dgm:cxn modelId="{BA2A42AB-5131-4D71-A1F4-F2CD7566B4CC}" srcId="{C4E624E6-7EE8-4626-9DBF-59652570CB53}" destId="{1A801C81-36B3-4EA5-A891-45165DAED9A9}" srcOrd="2" destOrd="0" parTransId="{53F428A2-3374-4BCF-B2B7-CAD0C4913703}" sibTransId="{36C475DB-2B1E-423F-BBF7-86655BD2C6AC}"/>
-    <dgm:cxn modelId="{040997B2-35FB-4106-B5DD-08BE9B102EDD}" srcId="{A0D6FE84-7B96-4511-B001-B07FDC9715FF}" destId="{41FA6E83-8B5B-438F-9105-203A95B83EF7}" srcOrd="0" destOrd="0" parTransId="{7657B5B8-8401-47E3-A864-C466DED310D4}" sibTransId="{87F03554-B732-4AB1-BE9D-FADA321B4E6D}"/>
-    <dgm:cxn modelId="{5CCFA8E2-E52B-463F-A719-56535C6894DA}" type="presOf" srcId="{A0D6FE84-7B96-4511-B001-B07FDC9715FF}" destId="{742ACACF-A2C7-48EC-BC50-F15928E3EA9A}" srcOrd="0" destOrd="0" presId="urn:microsoft.com/office/officeart/2005/8/layout/vList5"/>
-    <dgm:cxn modelId="{2923B2F3-5B20-474A-98DD-50E981B7BE49}" type="presOf" srcId="{94ED591F-654C-4649-8DB6-C1D5B7A7A9C4}" destId="{4A097E5D-8C80-464D-977D-A4FDFBB9A45F}" srcOrd="0" destOrd="0" presId="urn:microsoft.com/office/officeart/2005/8/layout/vList5"/>
-    <dgm:cxn modelId="{40D5F0FC-A461-4CCA-A8ED-6572B5B67F10}" srcId="{8F594DC0-072E-48CE-8E67-38979C3D1DA0}" destId="{EAD4C05B-1C20-44A7-9D5E-60FC68FF9561}" srcOrd="1" destOrd="0" parTransId="{91BC3865-643F-4473-B379-7899940EEBCC}" sibTransId="{1754BF92-40B1-4AD8-8C32-CE41B54A4AF5}"/>
-    <dgm:cxn modelId="{DDA02A39-FB33-4B77-A357-28054F6652BA}" type="presParOf" srcId="{BFEEC3BD-4037-49A1-8E5D-4FB48F9A9474}" destId="{B3F9DBAD-3C6F-413E-81D4-58BD1A3BFC8A}" srcOrd="0" destOrd="0" presId="urn:microsoft.com/office/officeart/2005/8/layout/vList5"/>
-    <dgm:cxn modelId="{170B15F6-A636-4139-B88C-8071CDFB8DE6}" type="presParOf" srcId="{B3F9DBAD-3C6F-413E-81D4-58BD1A3BFC8A}" destId="{742ACACF-A2C7-48EC-BC50-F15928E3EA9A}" srcOrd="0" destOrd="0" presId="urn:microsoft.com/office/officeart/2005/8/layout/vList5"/>
-    <dgm:cxn modelId="{A63039C2-0505-420B-8CF5-1FC2E56EE7CF}" type="presParOf" srcId="{B3F9DBAD-3C6F-413E-81D4-58BD1A3BFC8A}" destId="{8089D171-B2EA-4876-B2DC-F47766FE2B67}" srcOrd="1" destOrd="0" presId="urn:microsoft.com/office/officeart/2005/8/layout/vList5"/>
-    <dgm:cxn modelId="{0E3BEFB9-CFC3-4C06-964A-ABEFF43DE85B}" type="presParOf" srcId="{BFEEC3BD-4037-49A1-8E5D-4FB48F9A9474}" destId="{EF42EC5D-61C5-49AD-AA55-75F3B485BF72}" srcOrd="1" destOrd="0" presId="urn:microsoft.com/office/officeart/2005/8/layout/vList5"/>
-    <dgm:cxn modelId="{B257EE1C-8570-4195-AAB5-ADA23D9EB712}" type="presParOf" srcId="{BFEEC3BD-4037-49A1-8E5D-4FB48F9A9474}" destId="{F207A6F3-CA7A-4CFB-BAEB-C656A7022FFD}" srcOrd="2" destOrd="0" presId="urn:microsoft.com/office/officeart/2005/8/layout/vList5"/>
-    <dgm:cxn modelId="{8A96B6D1-E636-42D9-A274-47C23A8F63AB}" type="presParOf" srcId="{F207A6F3-CA7A-4CFB-BAEB-C656A7022FFD}" destId="{F6432572-6B47-455C-90F0-85992BA31D09}" srcOrd="0" destOrd="0" presId="urn:microsoft.com/office/officeart/2005/8/layout/vList5"/>
-    <dgm:cxn modelId="{288D96FF-224D-405A-9475-579CC4556474}" type="presParOf" srcId="{F207A6F3-CA7A-4CFB-BAEB-C656A7022FFD}" destId="{4A097E5D-8C80-464D-977D-A4FDFBB9A45F}" srcOrd="1" destOrd="0" presId="urn:microsoft.com/office/officeart/2005/8/layout/vList5"/>
-    <dgm:cxn modelId="{915DC2E7-9EF6-49F9-8922-48893D1B608C}" type="presParOf" srcId="{BFEEC3BD-4037-49A1-8E5D-4FB48F9A9474}" destId="{66AEE38D-044A-497A-B218-57FDF524E74D}" srcOrd="3" destOrd="0" presId="urn:microsoft.com/office/officeart/2005/8/layout/vList5"/>
-    <dgm:cxn modelId="{F74DE480-BF5D-4153-8FC8-9822D6C2FF61}" type="presParOf" srcId="{BFEEC3BD-4037-49A1-8E5D-4FB48F9A9474}" destId="{C5F2274C-7215-4CA9-A0A1-59220A914D4F}" srcOrd="4" destOrd="0" presId="urn:microsoft.com/office/officeart/2005/8/layout/vList5"/>
-    <dgm:cxn modelId="{F0F31258-B8BA-4DE2-97DD-08AEF7C9FB2B}" type="presParOf" srcId="{C5F2274C-7215-4CA9-A0A1-59220A914D4F}" destId="{D9D9AC0A-1C2F-4BC9-A636-BF56F10002C7}" srcOrd="0" destOrd="0" presId="urn:microsoft.com/office/officeart/2005/8/layout/vList5"/>
-    <dgm:cxn modelId="{17C9A3E2-D92F-4F6A-BFF0-D72807796314}" type="presParOf" srcId="{C5F2274C-7215-4CA9-A0A1-59220A914D4F}" destId="{73141C27-ECF7-4935-80E8-B24174A7125B}" srcOrd="1" destOrd="0" presId="urn:microsoft.com/office/officeart/2005/8/layout/vList5"/>
+    <dgm:cxn modelId="{2B96D320-E745-4E67-9E81-59189C0DBB37}" srcId="{4722B5D1-9FF0-444E-AF05-B7943FECADFD}" destId="{5E3ACCA9-2237-4591-8390-E87DDEF273D6}" srcOrd="0" destOrd="0" parTransId="{6DA72908-207A-414A-9F64-579824D3D6B1}" sibTransId="{4017227C-8243-4F71-B212-0C3D9ED43B2D}"/>
+    <dgm:cxn modelId="{F7D6E620-11D4-45B9-BAF3-CA4609AE3F83}" srcId="{B3297E59-6DA5-45C8-B2C9-C4B1CEF1412D}" destId="{312FC55F-C8EC-4236-91D6-C096342C0EC8}" srcOrd="0" destOrd="0" parTransId="{757A04A3-4354-450D-923E-86ACABF094D8}" sibTransId="{156433CE-2964-4787-8F84-6E55B064D28D}"/>
+    <dgm:cxn modelId="{EA8DEB26-3F8C-4C7D-8657-208B190F7BCC}" srcId="{B3297E59-6DA5-45C8-B2C9-C4B1CEF1412D}" destId="{4722B5D1-9FF0-444E-AF05-B7943FECADFD}" srcOrd="1" destOrd="0" parTransId="{D2F20A7C-AF17-4B98-A388-89CA45439743}" sibTransId="{03566995-9E32-45AF-A06F-87B00806B47E}"/>
+    <dgm:cxn modelId="{37686D3A-8315-41D6-90A1-C45E6EC5269C}" type="presOf" srcId="{312FC55F-C8EC-4236-91D6-C096342C0EC8}" destId="{DA130E29-39F2-4721-8434-F50BAED697F4}" srcOrd="0" destOrd="0" presId="urn:microsoft.com/office/officeart/2005/8/layout/process4"/>
+    <dgm:cxn modelId="{9E5E4C42-F144-4850-93BC-ACE04FA2362B}" type="presOf" srcId="{312FC55F-C8EC-4236-91D6-C096342C0EC8}" destId="{7A66EA75-20C4-4DA4-B911-4734A325BE93}" srcOrd="1" destOrd="0" presId="urn:microsoft.com/office/officeart/2005/8/layout/process4"/>
+    <dgm:cxn modelId="{7D126E4D-142E-4FAB-93FD-8E384D9697F2}" srcId="{DFFD45AC-626D-4E41-9B27-07A739F3C383}" destId="{215713E1-4C04-41C7-9E5C-94892B7BDC85}" srcOrd="0" destOrd="0" parTransId="{BD79C9B6-9775-4105-8001-33D964573641}" sibTransId="{8FEA6871-B997-4B93-A30C-C6485122EB62}"/>
+    <dgm:cxn modelId="{1ED88C97-C1D0-4EBA-BC69-EA3076637F9A}" type="presOf" srcId="{DFFD45AC-626D-4E41-9B27-07A739F3C383}" destId="{225B9DA5-AE1E-4AFC-A6B8-3D89FECB5DE3}" srcOrd="1" destOrd="0" presId="urn:microsoft.com/office/officeart/2005/8/layout/process4"/>
+    <dgm:cxn modelId="{2B7217A0-9F30-4007-88E0-4AAD824C14E7}" srcId="{B3297E59-6DA5-45C8-B2C9-C4B1CEF1412D}" destId="{DFFD45AC-626D-4E41-9B27-07A739F3C383}" srcOrd="2" destOrd="0" parTransId="{314EAE01-F735-45EB-AE52-6BBC49069134}" sibTransId="{72687876-7EFE-45BA-9E57-350D05F60F37}"/>
+    <dgm:cxn modelId="{A1E8DEA4-00A3-46EE-918C-E8087A6B3211}" srcId="{312FC55F-C8EC-4236-91D6-C096342C0EC8}" destId="{65FC19AF-04F6-46DE-BC5B-71F205C01195}" srcOrd="0" destOrd="0" parTransId="{50B99C99-5414-4CA3-8CDB-D2BC7449D522}" sibTransId="{D2B16A81-6FB3-43EA-B537-A4B0236BA3FC}"/>
+    <dgm:cxn modelId="{24618AB5-D1F3-4F4F-82BD-2208F081FD36}" type="presOf" srcId="{4722B5D1-9FF0-444E-AF05-B7943FECADFD}" destId="{A6C45478-8621-4E77-840B-0E960EBEB81A}" srcOrd="0" destOrd="0" presId="urn:microsoft.com/office/officeart/2005/8/layout/process4"/>
+    <dgm:cxn modelId="{9D2270B7-A28B-4158-888A-3CF16A998891}" type="presOf" srcId="{5E3ACCA9-2237-4591-8390-E87DDEF273D6}" destId="{17CE8A2C-DAB6-40B3-9A36-CF46C38A431C}" srcOrd="0" destOrd="0" presId="urn:microsoft.com/office/officeart/2005/8/layout/process4"/>
+    <dgm:cxn modelId="{454D4BCC-522C-4F57-B384-1D67EBD976CA}" type="presOf" srcId="{4722B5D1-9FF0-444E-AF05-B7943FECADFD}" destId="{10B9B615-8A0E-4958-B02C-FAE03CECEEAC}" srcOrd="1" destOrd="0" presId="urn:microsoft.com/office/officeart/2005/8/layout/process4"/>
+    <dgm:cxn modelId="{8D6AFFD5-84D3-4BE5-80B4-6078F0A75FF4}" type="presOf" srcId="{65FC19AF-04F6-46DE-BC5B-71F205C01195}" destId="{A760AF50-E3AE-48AD-A67C-C55D3B059B12}" srcOrd="0" destOrd="0" presId="urn:microsoft.com/office/officeart/2005/8/layout/process4"/>
+    <dgm:cxn modelId="{E313B8EC-233B-485C-9CAB-C1C2866F291D}" type="presOf" srcId="{215713E1-4C04-41C7-9E5C-94892B7BDC85}" destId="{65BDF7AF-96A0-4C52-A2C4-AB54A8D8FC7E}" srcOrd="0" destOrd="0" presId="urn:microsoft.com/office/officeart/2005/8/layout/process4"/>
+    <dgm:cxn modelId="{AB7B50F9-B066-42A5-8231-2B9B5AFFB52D}" type="presOf" srcId="{DFFD45AC-626D-4E41-9B27-07A739F3C383}" destId="{37FF7C4A-9C6A-4008-A3B9-DBE4EA1B5698}" srcOrd="0" destOrd="0" presId="urn:microsoft.com/office/officeart/2005/8/layout/process4"/>
+    <dgm:cxn modelId="{D3D758FC-D0A3-4681-B89F-43980181DB99}" type="presOf" srcId="{B3297E59-6DA5-45C8-B2C9-C4B1CEF1412D}" destId="{83AEFD3F-0FD9-4BE0-9818-0DB3EB5A7ECD}" srcOrd="0" destOrd="0" presId="urn:microsoft.com/office/officeart/2005/8/layout/process4"/>
+    <dgm:cxn modelId="{8FE156AE-1C83-4088-B5A4-701643143557}" type="presParOf" srcId="{83AEFD3F-0FD9-4BE0-9818-0DB3EB5A7ECD}" destId="{81153C38-2826-4A1D-BCC4-BAA2CC1D28F5}" srcOrd="0" destOrd="0" presId="urn:microsoft.com/office/officeart/2005/8/layout/process4"/>
+    <dgm:cxn modelId="{3A007ABC-42DE-4679-B328-E7D9758E92AB}" type="presParOf" srcId="{81153C38-2826-4A1D-BCC4-BAA2CC1D28F5}" destId="{37FF7C4A-9C6A-4008-A3B9-DBE4EA1B5698}" srcOrd="0" destOrd="0" presId="urn:microsoft.com/office/officeart/2005/8/layout/process4"/>
+    <dgm:cxn modelId="{6B991458-4B81-4020-A3B3-2769C3DCC4DA}" type="presParOf" srcId="{81153C38-2826-4A1D-BCC4-BAA2CC1D28F5}" destId="{225B9DA5-AE1E-4AFC-A6B8-3D89FECB5DE3}" srcOrd="1" destOrd="0" presId="urn:microsoft.com/office/officeart/2005/8/layout/process4"/>
+    <dgm:cxn modelId="{B655E3B7-9B0C-4294-8B0E-1C0CADB68725}" type="presParOf" srcId="{81153C38-2826-4A1D-BCC4-BAA2CC1D28F5}" destId="{9864DB20-2EE5-45B9-B12F-90BEA364222E}" srcOrd="2" destOrd="0" presId="urn:microsoft.com/office/officeart/2005/8/layout/process4"/>
+    <dgm:cxn modelId="{0434CB47-4011-4167-BED3-92141873495A}" type="presParOf" srcId="{9864DB20-2EE5-45B9-B12F-90BEA364222E}" destId="{65BDF7AF-96A0-4C52-A2C4-AB54A8D8FC7E}" srcOrd="0" destOrd="0" presId="urn:microsoft.com/office/officeart/2005/8/layout/process4"/>
+    <dgm:cxn modelId="{10558FF9-8FF1-4F4E-9096-4936DB1D087E}" type="presParOf" srcId="{83AEFD3F-0FD9-4BE0-9818-0DB3EB5A7ECD}" destId="{3FBB3A37-3356-45BF-BC28-FD744F603313}" srcOrd="1" destOrd="0" presId="urn:microsoft.com/office/officeart/2005/8/layout/process4"/>
+    <dgm:cxn modelId="{F3392625-8711-4C29-9723-DC38E738B718}" type="presParOf" srcId="{83AEFD3F-0FD9-4BE0-9818-0DB3EB5A7ECD}" destId="{A396EFE2-4F1C-487A-833B-BE61160A9D12}" srcOrd="2" destOrd="0" presId="urn:microsoft.com/office/officeart/2005/8/layout/process4"/>
+    <dgm:cxn modelId="{7C106D51-CA15-426A-8873-942C9BFDC870}" type="presParOf" srcId="{A396EFE2-4F1C-487A-833B-BE61160A9D12}" destId="{A6C45478-8621-4E77-840B-0E960EBEB81A}" srcOrd="0" destOrd="0" presId="urn:microsoft.com/office/officeart/2005/8/layout/process4"/>
+    <dgm:cxn modelId="{71E724B3-1312-48C7-AC1D-89D287135591}" type="presParOf" srcId="{A396EFE2-4F1C-487A-833B-BE61160A9D12}" destId="{10B9B615-8A0E-4958-B02C-FAE03CECEEAC}" srcOrd="1" destOrd="0" presId="urn:microsoft.com/office/officeart/2005/8/layout/process4"/>
+    <dgm:cxn modelId="{2443EEE1-1908-4314-94AB-159E97B4B4A2}" type="presParOf" srcId="{A396EFE2-4F1C-487A-833B-BE61160A9D12}" destId="{3A405396-3D1B-4F71-8999-6CA4CFB5E1D5}" srcOrd="2" destOrd="0" presId="urn:microsoft.com/office/officeart/2005/8/layout/process4"/>
+    <dgm:cxn modelId="{33CFFA04-24A5-4F81-A336-7A06DBBA8581}" type="presParOf" srcId="{3A405396-3D1B-4F71-8999-6CA4CFB5E1D5}" destId="{17CE8A2C-DAB6-40B3-9A36-CF46C38A431C}" srcOrd="0" destOrd="0" presId="urn:microsoft.com/office/officeart/2005/8/layout/process4"/>
+    <dgm:cxn modelId="{C9D75C90-197F-46FE-908D-92CC92270ACE}" type="presParOf" srcId="{83AEFD3F-0FD9-4BE0-9818-0DB3EB5A7ECD}" destId="{86346703-73F4-47CE-8A88-540E118505EE}" srcOrd="3" destOrd="0" presId="urn:microsoft.com/office/officeart/2005/8/layout/process4"/>
+    <dgm:cxn modelId="{C706EE74-13A3-44CA-88A3-A7BA254D9AAE}" type="presParOf" srcId="{83AEFD3F-0FD9-4BE0-9818-0DB3EB5A7ECD}" destId="{CF594111-B284-449B-8044-D2D846889A56}" srcOrd="4" destOrd="0" presId="urn:microsoft.com/office/officeart/2005/8/layout/process4"/>
+    <dgm:cxn modelId="{CA30215C-A569-45E0-926E-EA6D11E3867E}" type="presParOf" srcId="{CF594111-B284-449B-8044-D2D846889A56}" destId="{DA130E29-39F2-4721-8434-F50BAED697F4}" srcOrd="0" destOrd="0" presId="urn:microsoft.com/office/officeart/2005/8/layout/process4"/>
+    <dgm:cxn modelId="{66647214-0B01-47B2-910E-E7FC01413605}" type="presParOf" srcId="{CF594111-B284-449B-8044-D2D846889A56}" destId="{7A66EA75-20C4-4DA4-B911-4734A325BE93}" srcOrd="1" destOrd="0" presId="urn:microsoft.com/office/officeart/2005/8/layout/process4"/>
+    <dgm:cxn modelId="{176263EC-63DF-45C8-9BB1-095175769B54}" type="presParOf" srcId="{CF594111-B284-449B-8044-D2D846889A56}" destId="{D91002B0-61BD-416C-A52E-BED94AB27CF1}" srcOrd="2" destOrd="0" presId="urn:microsoft.com/office/officeart/2005/8/layout/process4"/>
+    <dgm:cxn modelId="{4489CE79-57B8-402E-9752-117C255EB242}" type="presParOf" srcId="{D91002B0-61BD-416C-A52E-BED94AB27CF1}" destId="{A760AF50-E3AE-48AD-A67C-C55D3B059B12}" srcOrd="0" destOrd="0" presId="urn:microsoft.com/office/officeart/2005/8/layout/process4"/>
   </dgm:cxnLst>
   <dgm:bg/>
   <dgm:whole/>
@@ -1334,34 +1294,143 @@
       <dsp:cNvGrpSpPr/>
     </dsp:nvGrpSpPr>
     <dsp:grpSpPr/>
-    <dsp:sp modelId="{8089D171-B2EA-4876-B2DC-F47766FE2B67}">
+    <dsp:sp modelId="{225B9DA5-AE1E-4AFC-A6B8-3D89FECB5DE3}">
       <dsp:nvSpPr>
         <dsp:cNvPr id="0" name=""/>
         <dsp:cNvSpPr/>
       </dsp:nvSpPr>
       <dsp:spPr>
-        <a:xfrm rot="5400000">
-          <a:off x="5581834" y="-1550608"/>
-          <a:ext cx="1588341" cy="5092659"/>
+        <a:xfrm>
+          <a:off x="0" y="7158803"/>
+          <a:ext cx="9229725" cy="2349678"/>
         </a:xfrm>
-        <a:prstGeom prst="round2SameRect">
+        <a:prstGeom prst="rect">
+          <a:avLst/>
+        </a:prstGeom>
+        <a:gradFill rotWithShape="0">
+          <a:gsLst>
+            <a:gs pos="0">
+              <a:schemeClr val="accent5">
+                <a:hueOff val="0"/>
+                <a:satOff val="0"/>
+                <a:lumOff val="0"/>
+                <a:alphaOff val="0"/>
+                <a:lumMod val="110000"/>
+                <a:satMod val="105000"/>
+                <a:tint val="67000"/>
+              </a:schemeClr>
+            </a:gs>
+            <a:gs pos="50000">
+              <a:schemeClr val="accent5">
+                <a:hueOff val="0"/>
+                <a:satOff val="0"/>
+                <a:lumOff val="0"/>
+                <a:alphaOff val="0"/>
+                <a:lumMod val="105000"/>
+                <a:satMod val="103000"/>
+                <a:tint val="73000"/>
+              </a:schemeClr>
+            </a:gs>
+            <a:gs pos="100000">
+              <a:schemeClr val="accent5">
+                <a:hueOff val="0"/>
+                <a:satOff val="0"/>
+                <a:lumOff val="0"/>
+                <a:alphaOff val="0"/>
+                <a:lumMod val="105000"/>
+                <a:satMod val="109000"/>
+                <a:tint val="81000"/>
+              </a:schemeClr>
+            </a:gs>
+          </a:gsLst>
+          <a:lin ang="5400000" scaled="0"/>
+        </a:gradFill>
+        <a:ln>
+          <a:noFill/>
+        </a:ln>
+        <a:effectLst/>
+        <a:scene3d>
+          <a:camera prst="orthographicFront"/>
+          <a:lightRig rig="flat" dir="t"/>
+        </a:scene3d>
+        <a:sp3d prstMaterial="dkEdge">
+          <a:bevelT w="8200" h="38100"/>
+        </a:sp3d>
+      </dsp:spPr>
+      <dsp:style>
+        <a:lnRef idx="0">
+          <a:scrgbClr r="0" g="0" b="0"/>
+        </a:lnRef>
+        <a:fillRef idx="2">
+          <a:scrgbClr r="0" g="0" b="0"/>
+        </a:fillRef>
+        <a:effectRef idx="1">
+          <a:scrgbClr r="0" g="0" b="0"/>
+        </a:effectRef>
+        <a:fontRef idx="minor">
+          <a:schemeClr val="dk1"/>
+        </a:fontRef>
+      </dsp:style>
+      <dsp:txBody>
+        <a:bodyPr spcFirstLastPara="0" vert="horz" wrap="square" lIns="341376" tIns="341376" rIns="341376" bIns="341376" numCol="1" spcCol="1270" anchor="ctr" anchorCtr="0">
+          <a:noAutofit/>
+        </a:bodyPr>
+        <a:lstStyle/>
+        <a:p>
+          <a:pPr marL="0" lvl="0" indent="0" algn="ctr" defTabSz="2133600">
+            <a:lnSpc>
+              <a:spcPct val="90000"/>
+            </a:lnSpc>
+            <a:spcBef>
+              <a:spcPct val="0"/>
+            </a:spcBef>
+            <a:spcAft>
+              <a:spcPct val="35000"/>
+            </a:spcAft>
+            <a:buNone/>
+          </a:pPr>
+          <a:r>
+            <a:rPr lang="en-US" sz="4800" b="1" kern="1200" dirty="0">
+              <a:latin typeface="Arial" panose="020B0604020202020204" pitchFamily="34" charset="0"/>
+              <a:cs typeface="Arial" panose="020B0604020202020204" pitchFamily="34" charset="0"/>
+            </a:rPr>
+            <a:t>Implementation</a:t>
+          </a:r>
+        </a:p>
+      </dsp:txBody>
+      <dsp:txXfrm>
+        <a:off x="0" y="7158803"/>
+        <a:ext cx="9229725" cy="1268826"/>
+      </dsp:txXfrm>
+    </dsp:sp>
+    <dsp:sp modelId="{65BDF7AF-96A0-4C52-A2C4-AB54A8D8FC7E}">
+      <dsp:nvSpPr>
+        <dsp:cNvPr id="0" name=""/>
+        <dsp:cNvSpPr/>
+      </dsp:nvSpPr>
+      <dsp:spPr>
+        <a:xfrm>
+          <a:off x="0" y="8380636"/>
+          <a:ext cx="9229725" cy="1080852"/>
+        </a:xfrm>
+        <a:prstGeom prst="rect">
           <a:avLst/>
         </a:prstGeom>
         <a:solidFill>
-          <a:schemeClr val="accent1">
+          <a:schemeClr val="accent5">
+            <a:tint val="40000"/>
             <a:alpha val="90000"/>
-            <a:tint val="40000"/>
             <a:hueOff val="0"/>
             <a:satOff val="0"/>
             <a:lumOff val="0"/>
             <a:alphaOff val="0"/>
           </a:schemeClr>
         </a:solidFill>
-        <a:ln w="12700" cap="flat" cmpd="sng" algn="ctr">
+        <a:ln w="6350" cap="flat" cmpd="sng" algn="ctr">
           <a:solidFill>
-            <a:schemeClr val="accent1">
+            <a:schemeClr val="accent5">
+              <a:tint val="40000"/>
               <a:alpha val="90000"/>
-              <a:tint val="40000"/>
               <a:hueOff val="0"/>
               <a:satOff val="0"/>
               <a:lumOff val="0"/>
@@ -1374,7 +1443,7 @@
         <a:effectLst/>
       </dsp:spPr>
       <dsp:style>
-        <a:lnRef idx="2">
+        <a:lnRef idx="1">
           <a:scrgbClr r="0" g="0" b="0"/>
         </a:lnRef>
         <a:fillRef idx="1">
@@ -1386,12 +1455,12 @@
         <a:fontRef idx="minor"/>
       </dsp:style>
       <dsp:txBody>
-        <a:bodyPr spcFirstLastPara="0" vert="horz" wrap="square" lIns="160020" tIns="80010" rIns="160020" bIns="80010" numCol="1" spcCol="1270" anchor="ctr" anchorCtr="0">
+        <a:bodyPr spcFirstLastPara="0" vert="horz" wrap="square" lIns="256032" tIns="45720" rIns="256032" bIns="45720" numCol="1" spcCol="1270" anchor="ctr" anchorCtr="0">
           <a:noAutofit/>
         </a:bodyPr>
         <a:lstStyle/>
         <a:p>
-          <a:pPr marL="285750" lvl="1" indent="-285750" algn="l" defTabSz="1866900">
+          <a:pPr marL="0" lvl="0" indent="0" algn="ctr" defTabSz="1600200">
             <a:lnSpc>
               <a:spcPct val="90000"/>
             </a:lnSpc>
@@ -1399,14 +1468,105 @@
               <a:spcPct val="0"/>
             </a:spcBef>
             <a:spcAft>
-              <a:spcPct val="15000"/>
+              <a:spcPct val="35000"/>
             </a:spcAft>
-            <a:buChar char="•"/>
+            <a:buNone/>
           </a:pPr>
-          <a:endParaRPr lang="en-US" sz="4200" kern="1200"/>
+          <a:endParaRPr lang="en-US" sz="3600" kern="1200">
+            <a:latin typeface="Arial" panose="020B0604020202020204" pitchFamily="34" charset="0"/>
+            <a:cs typeface="Arial" panose="020B0604020202020204" pitchFamily="34" charset="0"/>
+          </a:endParaRPr>
         </a:p>
+      </dsp:txBody>
+      <dsp:txXfrm>
+        <a:off x="0" y="8380636"/>
+        <a:ext cx="9229725" cy="1080852"/>
+      </dsp:txXfrm>
+    </dsp:sp>
+    <dsp:sp modelId="{10B9B615-8A0E-4958-B02C-FAE03CECEEAC}">
+      <dsp:nvSpPr>
+        <dsp:cNvPr id="0" name=""/>
+        <dsp:cNvSpPr/>
+      </dsp:nvSpPr>
+      <dsp:spPr>
+        <a:xfrm rot="10800000">
+          <a:off x="0" y="3580242"/>
+          <a:ext cx="9229725" cy="3613806"/>
+        </a:xfrm>
+        <a:prstGeom prst="upArrowCallout">
+          <a:avLst/>
+        </a:prstGeom>
+        <a:gradFill rotWithShape="0">
+          <a:gsLst>
+            <a:gs pos="0">
+              <a:schemeClr val="accent5">
+                <a:hueOff val="-3379271"/>
+                <a:satOff val="-8710"/>
+                <a:lumOff val="-5883"/>
+                <a:alphaOff val="0"/>
+                <a:lumMod val="110000"/>
+                <a:satMod val="105000"/>
+                <a:tint val="67000"/>
+              </a:schemeClr>
+            </a:gs>
+            <a:gs pos="50000">
+              <a:schemeClr val="accent5">
+                <a:hueOff val="-3379271"/>
+                <a:satOff val="-8710"/>
+                <a:lumOff val="-5883"/>
+                <a:alphaOff val="0"/>
+                <a:lumMod val="105000"/>
+                <a:satMod val="103000"/>
+                <a:tint val="73000"/>
+              </a:schemeClr>
+            </a:gs>
+            <a:gs pos="100000">
+              <a:schemeClr val="accent5">
+                <a:hueOff val="-3379271"/>
+                <a:satOff val="-8710"/>
+                <a:lumOff val="-5883"/>
+                <a:alphaOff val="0"/>
+                <a:lumMod val="105000"/>
+                <a:satMod val="109000"/>
+                <a:tint val="81000"/>
+              </a:schemeClr>
+            </a:gs>
+          </a:gsLst>
+          <a:lin ang="5400000" scaled="0"/>
+        </a:gradFill>
+        <a:ln>
+          <a:noFill/>
+        </a:ln>
+        <a:effectLst/>
+        <a:scene3d>
+          <a:camera prst="orthographicFront"/>
+          <a:lightRig rig="flat" dir="t"/>
+        </a:scene3d>
+        <a:sp3d prstMaterial="dkEdge">
+          <a:bevelT w="8200" h="38100"/>
+        </a:sp3d>
+      </dsp:spPr>
+      <dsp:style>
+        <a:lnRef idx="0">
+          <a:scrgbClr r="0" g="0" b="0"/>
+        </a:lnRef>
+        <a:fillRef idx="2">
+          <a:scrgbClr r="0" g="0" b="0"/>
+        </a:fillRef>
+        <a:effectRef idx="1">
+          <a:scrgbClr r="0" g="0" b="0"/>
+        </a:effectRef>
+        <a:fontRef idx="minor">
+          <a:schemeClr val="dk1"/>
+        </a:fontRef>
+      </dsp:style>
+      <dsp:txBody>
+        <a:bodyPr spcFirstLastPara="0" vert="horz" wrap="square" lIns="341376" tIns="341376" rIns="341376" bIns="341376" numCol="1" spcCol="1270" anchor="ctr" anchorCtr="0">
+          <a:noAutofit/>
+        </a:bodyPr>
+        <a:lstStyle/>
         <a:p>
-          <a:pPr marL="285750" lvl="1" indent="-285750" algn="l" defTabSz="1866900">
+          <a:pPr marL="0" lvl="0" indent="0" algn="ctr" defTabSz="2133600">
             <a:lnSpc>
               <a:spcPct val="90000"/>
             </a:lnSpc>
@@ -1414,42 +1574,52 @@
               <a:spcPct val="0"/>
             </a:spcBef>
             <a:spcAft>
-              <a:spcPct val="15000"/>
+              <a:spcPct val="35000"/>
             </a:spcAft>
-            <a:buChar char="•"/>
+            <a:buNone/>
           </a:pPr>
-          <a:endParaRPr lang="en-US" sz="4200" kern="1200"/>
+          <a:r>
+            <a:rPr lang="en-US" sz="4800" b="1" kern="1200" dirty="0">
+              <a:latin typeface="Arial" panose="020B0604020202020204" pitchFamily="34" charset="0"/>
+              <a:cs typeface="Arial" panose="020B0604020202020204" pitchFamily="34" charset="0"/>
+            </a:rPr>
+            <a:t>Testing</a:t>
+          </a:r>
         </a:p>
       </dsp:txBody>
-      <dsp:txXfrm rot="-5400000">
-        <a:off x="3829675" y="279087"/>
-        <a:ext cx="5015123" cy="1433269"/>
+      <dsp:txXfrm rot="-10800000">
+        <a:off x="0" y="3580242"/>
+        <a:ext cx="9229725" cy="1268445"/>
       </dsp:txXfrm>
     </dsp:sp>
-    <dsp:sp modelId="{742ACACF-A2C7-48EC-BC50-F15928E3EA9A}">
+    <dsp:sp modelId="{17CE8A2C-DAB6-40B3-9A36-CF46C38A431C}">
       <dsp:nvSpPr>
         <dsp:cNvPr id="0" name=""/>
         <dsp:cNvSpPr/>
       </dsp:nvSpPr>
       <dsp:spPr>
         <a:xfrm>
-          <a:off x="0" y="3008"/>
-          <a:ext cx="3829675" cy="1985426"/>
+          <a:off x="0" y="4848688"/>
+          <a:ext cx="9229725" cy="1080528"/>
         </a:xfrm>
-        <a:prstGeom prst="roundRect">
+        <a:prstGeom prst="rect">
           <a:avLst/>
         </a:prstGeom>
         <a:solidFill>
-          <a:schemeClr val="accent1">
-            <a:hueOff val="0"/>
-            <a:satOff val="0"/>
-            <a:lumOff val="0"/>
+          <a:schemeClr val="accent5">
+            <a:tint val="40000"/>
+            <a:alpha val="90000"/>
+            <a:hueOff val="-3369881"/>
+            <a:satOff val="-11416"/>
+            <a:lumOff val="-1464"/>
             <a:alphaOff val="0"/>
           </a:schemeClr>
         </a:solidFill>
-        <a:ln w="12700" cap="flat" cmpd="sng" algn="ctr">
+        <a:ln w="6350" cap="flat" cmpd="sng" algn="ctr">
           <a:solidFill>
-            <a:schemeClr val="lt1">
+            <a:schemeClr val="accent5">
+              <a:tint val="40000"/>
+              <a:alpha val="90000"/>
               <a:hueOff val="0"/>
               <a:satOff val="0"/>
               <a:lumOff val="0"/>
@@ -1462,7 +1632,7 @@
         <a:effectLst/>
       </dsp:spPr>
       <dsp:style>
-        <a:lnRef idx="2">
+        <a:lnRef idx="1">
           <a:scrgbClr r="0" g="0" b="0"/>
         </a:lnRef>
         <a:fillRef idx="1">
@@ -1471,12 +1641,199 @@
         <a:effectRef idx="0">
           <a:scrgbClr r="0" g="0" b="0"/>
         </a:effectRef>
+        <a:fontRef idx="minor"/>
+      </dsp:style>
+      <dsp:txBody>
+        <a:bodyPr spcFirstLastPara="0" vert="horz" wrap="square" lIns="256032" tIns="45720" rIns="256032" bIns="45720" numCol="1" spcCol="1270" anchor="ctr" anchorCtr="0">
+          <a:noAutofit/>
+        </a:bodyPr>
+        <a:lstStyle/>
+        <a:p>
+          <a:pPr marL="0" lvl="0" indent="0" algn="ctr" defTabSz="1600200">
+            <a:lnSpc>
+              <a:spcPct val="90000"/>
+            </a:lnSpc>
+            <a:spcBef>
+              <a:spcPct val="0"/>
+            </a:spcBef>
+            <a:spcAft>
+              <a:spcPct val="35000"/>
+            </a:spcAft>
+            <a:buNone/>
+          </a:pPr>
+          <a:endParaRPr lang="en-US" sz="3600" kern="1200" dirty="0">
+            <a:latin typeface="Arial" panose="020B0604020202020204" pitchFamily="34" charset="0"/>
+            <a:cs typeface="Arial" panose="020B0604020202020204" pitchFamily="34" charset="0"/>
+          </a:endParaRPr>
+        </a:p>
+      </dsp:txBody>
+      <dsp:txXfrm>
+        <a:off x="0" y="4848688"/>
+        <a:ext cx="9229725" cy="1080528"/>
+      </dsp:txXfrm>
+    </dsp:sp>
+    <dsp:sp modelId="{7A66EA75-20C4-4DA4-B911-4734A325BE93}">
+      <dsp:nvSpPr>
+        <dsp:cNvPr id="0" name=""/>
+        <dsp:cNvSpPr/>
+      </dsp:nvSpPr>
+      <dsp:spPr>
+        <a:xfrm rot="10800000">
+          <a:off x="0" y="0"/>
+          <a:ext cx="9229725" cy="3613806"/>
+        </a:xfrm>
+        <a:prstGeom prst="upArrowCallout">
+          <a:avLst/>
+        </a:prstGeom>
+        <a:gradFill rotWithShape="0">
+          <a:gsLst>
+            <a:gs pos="0">
+              <a:schemeClr val="accent5">
+                <a:hueOff val="-6758543"/>
+                <a:satOff val="-17419"/>
+                <a:lumOff val="-11765"/>
+                <a:alphaOff val="0"/>
+                <a:lumMod val="110000"/>
+                <a:satMod val="105000"/>
+                <a:tint val="67000"/>
+              </a:schemeClr>
+            </a:gs>
+            <a:gs pos="50000">
+              <a:schemeClr val="accent5">
+                <a:hueOff val="-6758543"/>
+                <a:satOff val="-17419"/>
+                <a:lumOff val="-11765"/>
+                <a:alphaOff val="0"/>
+                <a:lumMod val="105000"/>
+                <a:satMod val="103000"/>
+                <a:tint val="73000"/>
+              </a:schemeClr>
+            </a:gs>
+            <a:gs pos="100000">
+              <a:schemeClr val="accent5">
+                <a:hueOff val="-6758543"/>
+                <a:satOff val="-17419"/>
+                <a:lumOff val="-11765"/>
+                <a:alphaOff val="0"/>
+                <a:lumMod val="105000"/>
+                <a:satMod val="109000"/>
+                <a:tint val="81000"/>
+              </a:schemeClr>
+            </a:gs>
+          </a:gsLst>
+          <a:lin ang="5400000" scaled="0"/>
+        </a:gradFill>
+        <a:ln>
+          <a:noFill/>
+        </a:ln>
+        <a:effectLst/>
+        <a:scene3d>
+          <a:camera prst="orthographicFront"/>
+          <a:lightRig rig="flat" dir="t"/>
+        </a:scene3d>
+        <a:sp3d prstMaterial="dkEdge">
+          <a:bevelT w="8200" h="38100"/>
+        </a:sp3d>
+      </dsp:spPr>
+      <dsp:style>
+        <a:lnRef idx="0">
+          <a:scrgbClr r="0" g="0" b="0"/>
+        </a:lnRef>
+        <a:fillRef idx="2">
+          <a:scrgbClr r="0" g="0" b="0"/>
+        </a:fillRef>
+        <a:effectRef idx="1">
+          <a:scrgbClr r="0" g="0" b="0"/>
+        </a:effectRef>
         <a:fontRef idx="minor">
-          <a:schemeClr val="lt1"/>
+          <a:schemeClr val="dk1"/>
         </a:fontRef>
       </dsp:style>
       <dsp:txBody>
-        <a:bodyPr spcFirstLastPara="0" vert="horz" wrap="square" lIns="137160" tIns="68580" rIns="137160" bIns="68580" numCol="1" spcCol="1270" anchor="ctr" anchorCtr="0">
+        <a:bodyPr spcFirstLastPara="0" vert="horz" wrap="square" lIns="341376" tIns="341376" rIns="341376" bIns="341376" numCol="1" spcCol="1270" anchor="ctr" anchorCtr="0">
+          <a:noAutofit/>
+        </a:bodyPr>
+        <a:lstStyle/>
+        <a:p>
+          <a:pPr marL="0" lvl="0" indent="0" algn="ctr" defTabSz="2133600">
+            <a:lnSpc>
+              <a:spcPct val="90000"/>
+            </a:lnSpc>
+            <a:spcBef>
+              <a:spcPct val="0"/>
+            </a:spcBef>
+            <a:spcAft>
+              <a:spcPct val="35000"/>
+            </a:spcAft>
+            <a:buNone/>
+          </a:pPr>
+          <a:r>
+            <a:rPr lang="en-US" sz="4800" b="1" kern="1200" dirty="0">
+              <a:latin typeface="Arial" panose="020B0604020202020204" pitchFamily="34" charset="0"/>
+              <a:cs typeface="Arial" panose="020B0604020202020204" pitchFamily="34" charset="0"/>
+            </a:rPr>
+            <a:t>Development</a:t>
+          </a:r>
+        </a:p>
+      </dsp:txBody>
+      <dsp:txXfrm rot="-10800000">
+        <a:off x="0" y="0"/>
+        <a:ext cx="9229725" cy="1268445"/>
+      </dsp:txXfrm>
+    </dsp:sp>
+    <dsp:sp modelId="{A760AF50-E3AE-48AD-A67C-C55D3B059B12}">
+      <dsp:nvSpPr>
+        <dsp:cNvPr id="0" name=""/>
+        <dsp:cNvSpPr/>
+      </dsp:nvSpPr>
+      <dsp:spPr>
+        <a:xfrm>
+          <a:off x="0" y="1270126"/>
+          <a:ext cx="9229725" cy="1080528"/>
+        </a:xfrm>
+        <a:prstGeom prst="rect">
+          <a:avLst/>
+        </a:prstGeom>
+        <a:solidFill>
+          <a:schemeClr val="accent5">
+            <a:tint val="40000"/>
+            <a:alpha val="90000"/>
+            <a:hueOff val="-6739762"/>
+            <a:satOff val="-22832"/>
+            <a:lumOff val="-2928"/>
+            <a:alphaOff val="0"/>
+          </a:schemeClr>
+        </a:solidFill>
+        <a:ln w="6350" cap="flat" cmpd="sng" algn="ctr">
+          <a:solidFill>
+            <a:schemeClr val="accent5">
+              <a:tint val="40000"/>
+              <a:alpha val="90000"/>
+              <a:hueOff val="0"/>
+              <a:satOff val="0"/>
+              <a:lumOff val="0"/>
+              <a:alphaOff val="0"/>
+            </a:schemeClr>
+          </a:solidFill>
+          <a:prstDash val="solid"/>
+          <a:miter lim="800000"/>
+        </a:ln>
+        <a:effectLst/>
+      </dsp:spPr>
+      <dsp:style>
+        <a:lnRef idx="1">
+          <a:scrgbClr r="0" g="0" b="0"/>
+        </a:lnRef>
+        <a:fillRef idx="1">
+          <a:scrgbClr r="0" g="0" b="0"/>
+        </a:fillRef>
+        <a:effectRef idx="0">
+          <a:scrgbClr r="0" g="0" b="0"/>
+        </a:effectRef>
+        <a:fontRef idx="minor"/>
+      </dsp:style>
+      <dsp:txBody>
+        <a:bodyPr spcFirstLastPara="0" vert="horz" wrap="square" lIns="256032" tIns="45720" rIns="256032" bIns="45720" numCol="1" spcCol="1270" anchor="ctr" anchorCtr="0">
           <a:noAutofit/>
         </a:bodyPr>
         <a:lstStyle/>
@@ -1494,363 +1851,17 @@
             <a:buNone/>
           </a:pPr>
           <a:r>
-            <a:rPr lang="en-US" sz="3600" b="1" kern="1200" dirty="0">
+            <a:rPr lang="en-US" sz="3600" kern="1200" dirty="0">
               <a:latin typeface="Arial" panose="020B0604020202020204" pitchFamily="34" charset="0"/>
               <a:cs typeface="Arial" panose="020B0604020202020204" pitchFamily="34" charset="0"/>
             </a:rPr>
-            <a:t>Development</a:t>
+            <a:t>Blah</a:t>
           </a:r>
         </a:p>
       </dsp:txBody>
       <dsp:txXfrm>
-        <a:off x="96921" y="99929"/>
-        <a:ext cx="3635833" cy="1791584"/>
-      </dsp:txXfrm>
-    </dsp:sp>
-    <dsp:sp modelId="{4A097E5D-8C80-464D-977D-A4FDFBB9A45F}">
-      <dsp:nvSpPr>
-        <dsp:cNvPr id="0" name=""/>
-        <dsp:cNvSpPr/>
-      </dsp:nvSpPr>
-      <dsp:spPr>
-        <a:xfrm rot="5400000">
-          <a:off x="5579832" y="215628"/>
-          <a:ext cx="1588341" cy="5729582"/>
-        </a:xfrm>
-        <a:prstGeom prst="round2SameRect">
-          <a:avLst/>
-        </a:prstGeom>
-        <a:solidFill>
-          <a:schemeClr val="accent1">
-            <a:alpha val="90000"/>
-            <a:tint val="40000"/>
-            <a:hueOff val="0"/>
-            <a:satOff val="0"/>
-            <a:lumOff val="0"/>
-            <a:alphaOff val="0"/>
-          </a:schemeClr>
-        </a:solidFill>
-        <a:ln w="12700" cap="flat" cmpd="sng" algn="ctr">
-          <a:solidFill>
-            <a:schemeClr val="accent1">
-              <a:alpha val="90000"/>
-              <a:tint val="40000"/>
-              <a:hueOff val="0"/>
-              <a:satOff val="0"/>
-              <a:lumOff val="0"/>
-              <a:alphaOff val="0"/>
-            </a:schemeClr>
-          </a:solidFill>
-          <a:prstDash val="solid"/>
-          <a:miter lim="800000"/>
-        </a:ln>
-        <a:effectLst/>
-      </dsp:spPr>
-      <dsp:style>
-        <a:lnRef idx="2">
-          <a:scrgbClr r="0" g="0" b="0"/>
-        </a:lnRef>
-        <a:fillRef idx="1">
-          <a:scrgbClr r="0" g="0" b="0"/>
-        </a:fillRef>
-        <a:effectRef idx="0">
-          <a:scrgbClr r="0" g="0" b="0"/>
-        </a:effectRef>
-        <a:fontRef idx="minor"/>
-      </dsp:style>
-      <dsp:txBody>
-        <a:bodyPr spcFirstLastPara="0" vert="horz" wrap="square" lIns="160020" tIns="80010" rIns="160020" bIns="80010" numCol="1" spcCol="1270" anchor="ctr" anchorCtr="0">
-          <a:noAutofit/>
-        </a:bodyPr>
-        <a:lstStyle/>
-        <a:p>
-          <a:pPr marL="285750" lvl="1" indent="-285750" algn="l" defTabSz="1866900">
-            <a:lnSpc>
-              <a:spcPct val="90000"/>
-            </a:lnSpc>
-            <a:spcBef>
-              <a:spcPct val="0"/>
-            </a:spcBef>
-            <a:spcAft>
-              <a:spcPct val="15000"/>
-            </a:spcAft>
-            <a:buChar char="•"/>
-          </a:pPr>
-          <a:endParaRPr lang="en-US" sz="4200" kern="1200"/>
-        </a:p>
-        <a:p>
-          <a:pPr marL="285750" lvl="1" indent="-285750" algn="l" defTabSz="1866900">
-            <a:lnSpc>
-              <a:spcPct val="90000"/>
-            </a:lnSpc>
-            <a:spcBef>
-              <a:spcPct val="0"/>
-            </a:spcBef>
-            <a:spcAft>
-              <a:spcPct val="15000"/>
-            </a:spcAft>
-            <a:buChar char="•"/>
-          </a:pPr>
-          <a:endParaRPr lang="en-US" sz="4200" kern="1200"/>
-        </a:p>
-      </dsp:txBody>
-      <dsp:txXfrm rot="-5400000">
-        <a:off x="3509212" y="2363784"/>
-        <a:ext cx="5652046" cy="1433269"/>
-      </dsp:txXfrm>
-    </dsp:sp>
-    <dsp:sp modelId="{F6432572-6B47-455C-90F0-85992BA31D09}">
-      <dsp:nvSpPr>
-        <dsp:cNvPr id="0" name=""/>
-        <dsp:cNvSpPr/>
-      </dsp:nvSpPr>
-      <dsp:spPr>
-        <a:xfrm>
-          <a:off x="0" y="2087706"/>
-          <a:ext cx="3509211" cy="1985426"/>
-        </a:xfrm>
-        <a:prstGeom prst="roundRect">
-          <a:avLst/>
-        </a:prstGeom>
-        <a:solidFill>
-          <a:schemeClr val="accent1">
-            <a:hueOff val="0"/>
-            <a:satOff val="0"/>
-            <a:lumOff val="0"/>
-            <a:alphaOff val="0"/>
-          </a:schemeClr>
-        </a:solidFill>
-        <a:ln w="12700" cap="flat" cmpd="sng" algn="ctr">
-          <a:solidFill>
-            <a:schemeClr val="lt1">
-              <a:hueOff val="0"/>
-              <a:satOff val="0"/>
-              <a:lumOff val="0"/>
-              <a:alphaOff val="0"/>
-            </a:schemeClr>
-          </a:solidFill>
-          <a:prstDash val="solid"/>
-          <a:miter lim="800000"/>
-        </a:ln>
-        <a:effectLst/>
-      </dsp:spPr>
-      <dsp:style>
-        <a:lnRef idx="2">
-          <a:scrgbClr r="0" g="0" b="0"/>
-        </a:lnRef>
-        <a:fillRef idx="1">
-          <a:scrgbClr r="0" g="0" b="0"/>
-        </a:fillRef>
-        <a:effectRef idx="0">
-          <a:scrgbClr r="0" g="0" b="0"/>
-        </a:effectRef>
-        <a:fontRef idx="minor">
-          <a:schemeClr val="lt1"/>
-        </a:fontRef>
-      </dsp:style>
-      <dsp:txBody>
-        <a:bodyPr spcFirstLastPara="0" vert="horz" wrap="square" lIns="137160" tIns="68580" rIns="137160" bIns="68580" numCol="1" spcCol="1270" anchor="ctr" anchorCtr="0">
-          <a:noAutofit/>
-        </a:bodyPr>
-        <a:lstStyle/>
-        <a:p>
-          <a:pPr marL="0" lvl="0" indent="0" algn="ctr" defTabSz="1600200">
-            <a:lnSpc>
-              <a:spcPct val="90000"/>
-            </a:lnSpc>
-            <a:spcBef>
-              <a:spcPct val="0"/>
-            </a:spcBef>
-            <a:spcAft>
-              <a:spcPct val="35000"/>
-            </a:spcAft>
-            <a:buNone/>
-          </a:pPr>
-          <a:r>
-            <a:rPr lang="en-US" sz="3600" b="1" kern="1200" dirty="0">
-              <a:latin typeface="Arial" panose="020B0604020202020204" pitchFamily="34" charset="0"/>
-              <a:cs typeface="Arial" panose="020B0604020202020204" pitchFamily="34" charset="0"/>
-            </a:rPr>
-            <a:t>Testing</a:t>
-          </a:r>
-        </a:p>
-      </dsp:txBody>
-      <dsp:txXfrm>
-        <a:off x="96921" y="2184627"/>
-        <a:ext cx="3315369" cy="1791584"/>
-      </dsp:txXfrm>
-    </dsp:sp>
-    <dsp:sp modelId="{73141C27-ECF7-4935-80E8-B24174A7125B}">
-      <dsp:nvSpPr>
-        <dsp:cNvPr id="0" name=""/>
-        <dsp:cNvSpPr/>
-      </dsp:nvSpPr>
-      <dsp:spPr>
-        <a:xfrm rot="5400000">
-          <a:off x="5489887" y="2207914"/>
-          <a:ext cx="1588341" cy="5914407"/>
-        </a:xfrm>
-        <a:prstGeom prst="round2SameRect">
-          <a:avLst/>
-        </a:prstGeom>
-        <a:solidFill>
-          <a:schemeClr val="accent1">
-            <a:alpha val="90000"/>
-            <a:tint val="40000"/>
-            <a:hueOff val="0"/>
-            <a:satOff val="0"/>
-            <a:lumOff val="0"/>
-            <a:alphaOff val="0"/>
-          </a:schemeClr>
-        </a:solidFill>
-        <a:ln w="12700" cap="flat" cmpd="sng" algn="ctr">
-          <a:solidFill>
-            <a:schemeClr val="accent1">
-              <a:alpha val="90000"/>
-              <a:tint val="40000"/>
-              <a:hueOff val="0"/>
-              <a:satOff val="0"/>
-              <a:lumOff val="0"/>
-              <a:alphaOff val="0"/>
-            </a:schemeClr>
-          </a:solidFill>
-          <a:prstDash val="solid"/>
-          <a:miter lim="800000"/>
-        </a:ln>
-        <a:effectLst/>
-      </dsp:spPr>
-      <dsp:style>
-        <a:lnRef idx="2">
-          <a:scrgbClr r="0" g="0" b="0"/>
-        </a:lnRef>
-        <a:fillRef idx="1">
-          <a:scrgbClr r="0" g="0" b="0"/>
-        </a:fillRef>
-        <a:effectRef idx="0">
-          <a:scrgbClr r="0" g="0" b="0"/>
-        </a:effectRef>
-        <a:fontRef idx="minor"/>
-      </dsp:style>
-      <dsp:txBody>
-        <a:bodyPr spcFirstLastPara="0" vert="horz" wrap="square" lIns="160020" tIns="80010" rIns="160020" bIns="80010" numCol="1" spcCol="1270" anchor="ctr" anchorCtr="0">
-          <a:noAutofit/>
-        </a:bodyPr>
-        <a:lstStyle/>
-        <a:p>
-          <a:pPr marL="285750" lvl="1" indent="-285750" algn="l" defTabSz="1866900">
-            <a:lnSpc>
-              <a:spcPct val="90000"/>
-            </a:lnSpc>
-            <a:spcBef>
-              <a:spcPct val="0"/>
-            </a:spcBef>
-            <a:spcAft>
-              <a:spcPct val="15000"/>
-            </a:spcAft>
-            <a:buChar char="•"/>
-          </a:pPr>
-          <a:endParaRPr lang="en-US" sz="4200" kern="1200"/>
-        </a:p>
-        <a:p>
-          <a:pPr marL="285750" lvl="1" indent="-285750" algn="l" defTabSz="1866900">
-            <a:lnSpc>
-              <a:spcPct val="90000"/>
-            </a:lnSpc>
-            <a:spcBef>
-              <a:spcPct val="0"/>
-            </a:spcBef>
-            <a:spcAft>
-              <a:spcPct val="15000"/>
-            </a:spcAft>
-            <a:buChar char="•"/>
-          </a:pPr>
-          <a:endParaRPr lang="en-US" sz="4200" kern="1200"/>
-        </a:p>
-      </dsp:txBody>
-      <dsp:txXfrm rot="-5400000">
-        <a:off x="3326854" y="4448483"/>
-        <a:ext cx="5836871" cy="1433269"/>
-      </dsp:txXfrm>
-    </dsp:sp>
-    <dsp:sp modelId="{D9D9AC0A-1C2F-4BC9-A636-BF56F10002C7}">
-      <dsp:nvSpPr>
-        <dsp:cNvPr id="0" name=""/>
-        <dsp:cNvSpPr/>
-      </dsp:nvSpPr>
-      <dsp:spPr>
-        <a:xfrm>
-          <a:off x="0" y="4172404"/>
-          <a:ext cx="3326854" cy="1985426"/>
-        </a:xfrm>
-        <a:prstGeom prst="roundRect">
-          <a:avLst/>
-        </a:prstGeom>
-        <a:solidFill>
-          <a:schemeClr val="accent1">
-            <a:hueOff val="0"/>
-            <a:satOff val="0"/>
-            <a:lumOff val="0"/>
-            <a:alphaOff val="0"/>
-          </a:schemeClr>
-        </a:solidFill>
-        <a:ln w="12700" cap="flat" cmpd="sng" algn="ctr">
-          <a:solidFill>
-            <a:schemeClr val="lt1">
-              <a:hueOff val="0"/>
-              <a:satOff val="0"/>
-              <a:lumOff val="0"/>
-              <a:alphaOff val="0"/>
-            </a:schemeClr>
-          </a:solidFill>
-          <a:prstDash val="solid"/>
-          <a:miter lim="800000"/>
-        </a:ln>
-        <a:effectLst/>
-      </dsp:spPr>
-      <dsp:style>
-        <a:lnRef idx="2">
-          <a:scrgbClr r="0" g="0" b="0"/>
-        </a:lnRef>
-        <a:fillRef idx="1">
-          <a:scrgbClr r="0" g="0" b="0"/>
-        </a:fillRef>
-        <a:effectRef idx="0">
-          <a:scrgbClr r="0" g="0" b="0"/>
-        </a:effectRef>
-        <a:fontRef idx="minor">
-          <a:schemeClr val="lt1"/>
-        </a:fontRef>
-      </dsp:style>
-      <dsp:txBody>
-        <a:bodyPr spcFirstLastPara="0" vert="horz" wrap="square" lIns="137160" tIns="68580" rIns="137160" bIns="68580" numCol="1" spcCol="1270" anchor="ctr" anchorCtr="0">
-          <a:noAutofit/>
-        </a:bodyPr>
-        <a:lstStyle/>
-        <a:p>
-          <a:pPr marL="0" lvl="0" indent="0" algn="ctr" defTabSz="1600200">
-            <a:lnSpc>
-              <a:spcPct val="90000"/>
-            </a:lnSpc>
-            <a:spcBef>
-              <a:spcPct val="0"/>
-            </a:spcBef>
-            <a:spcAft>
-              <a:spcPct val="35000"/>
-            </a:spcAft>
-            <a:buNone/>
-          </a:pPr>
-          <a:r>
-            <a:rPr lang="en-US" sz="3600" b="1" kern="1200" dirty="0">
-              <a:latin typeface="Arial" panose="020B0604020202020204" pitchFamily="34" charset="0"/>
-              <a:cs typeface="Arial" panose="020B0604020202020204" pitchFamily="34" charset="0"/>
-            </a:rPr>
-            <a:t>Integration</a:t>
-          </a:r>
-        </a:p>
-      </dsp:txBody>
-      <dsp:txXfrm>
-        <a:off x="96921" y="4269325"/>
-        <a:ext cx="3133012" cy="1791584"/>
+        <a:off x="0" y="1270126"/>
+        <a:ext cx="9229725" cy="1080528"/>
       </dsp:txXfrm>
     </dsp:sp>
   </dsp:spTree>
@@ -1858,12 +1869,12 @@
 </file>
 
 <file path=ppt/diagrams/layout1.xml><?xml version="1.0" encoding="utf-8"?>
-<dgm:layoutDef xmlns:dgm="http://schemas.openxmlformats.org/drawingml/2006/diagram" xmlns:a="http://schemas.openxmlformats.org/drawingml/2006/main" uniqueId="urn:microsoft.com/office/officeart/2005/8/layout/vList5">
+<dgm:layoutDef xmlns:dgm="http://schemas.openxmlformats.org/drawingml/2006/diagram" xmlns:a="http://schemas.openxmlformats.org/drawingml/2006/main" uniqueId="urn:microsoft.com/office/officeart/2005/8/layout/process4">
   <dgm:title val=""/>
   <dgm:desc val=""/>
   <dgm:catLst>
-    <dgm:cat type="list" pri="15000"/>
-    <dgm:cat type="convert" pri="2000"/>
+    <dgm:cat type="process" pri="16000"/>
+    <dgm:cat type="list" pri="20000"/>
   </dgm:catLst>
   <dgm:sampData>
     <dgm:dataModel>
@@ -1964,123 +1975,243 @@
       <dgm:animLvl val="lvl"/>
       <dgm:resizeHandles val="exact"/>
     </dgm:varLst>
-    <dgm:choose name="Name1">
-      <dgm:if name="Name2" func="var" arg="dir" op="equ" val="norm">
-        <dgm:alg type="lin">
-          <dgm:param type="linDir" val="fromT"/>
-          <dgm:param type="nodeHorzAlign" val="l"/>
-        </dgm:alg>
-      </dgm:if>
-      <dgm:else name="Name3">
-        <dgm:alg type="lin">
-          <dgm:param type="linDir" val="fromT"/>
-          <dgm:param type="nodeHorzAlign" val="r"/>
-        </dgm:alg>
-      </dgm:else>
-    </dgm:choose>
+    <dgm:alg type="lin">
+      <dgm:param type="linDir" val="fromB"/>
+    </dgm:alg>
     <dgm:shape xmlns:r="http://schemas.openxmlformats.org/officeDocument/2006/relationships" r:blip="">
       <dgm:adjLst/>
     </dgm:shape>
     <dgm:presOf/>
     <dgm:constrLst>
-      <dgm:constr type="h" for="ch" forName="linNode" refType="h"/>
-      <dgm:constr type="w" for="ch" forName="linNode" refType="w"/>
-      <dgm:constr type="h" for="ch" forName="sp" refType="h" fact="0.05"/>
-      <dgm:constr type="primFontSz" for="des" forName="parentText" op="equ" val="65"/>
-      <dgm:constr type="secFontSz" for="des" forName="descendantText" op="equ"/>
+      <dgm:constr type="h" for="ch" forName="boxAndChildren" refType="h"/>
+      <dgm:constr type="h" for="ch" forName="arrowAndChildren" refType="h" refFor="ch" refForName="boxAndChildren" op="equ" fact="1.538"/>
+      <dgm:constr type="w" for="ch" forName="arrowAndChildren" refType="w"/>
+      <dgm:constr type="w" for="ch" forName="boxAndChildren" refType="w"/>
+      <dgm:constr type="h" for="ch" forName="sp" refType="h" fact="-0.015"/>
+      <dgm:constr type="primFontSz" for="des" forName="parentTextBox" val="65"/>
+      <dgm:constr type="primFontSz" for="des" forName="parentTextArrow" refType="primFontSz" refFor="des" refForName="parentTextBox" op="equ"/>
+      <dgm:constr type="primFontSz" for="des" forName="childTextArrow" val="65"/>
+      <dgm:constr type="primFontSz" for="des" forName="childTextBox" refType="primFontSz" refFor="des" refForName="childTextArrow" op="equ"/>
     </dgm:constrLst>
     <dgm:ruleLst/>
-    <dgm:forEach name="Name4" axis="ch" ptType="node">
-      <dgm:layoutNode name="linNode">
-        <dgm:choose name="Name5">
-          <dgm:if name="Name6" func="var" arg="dir" op="equ" val="norm">
-            <dgm:alg type="lin">
-              <dgm:param type="linDir" val="fromL"/>
-            </dgm:alg>
-          </dgm:if>
-          <dgm:else name="Name7">
-            <dgm:alg type="lin">
-              <dgm:param type="linDir" val="fromR"/>
-            </dgm:alg>
-          </dgm:else>
-        </dgm:choose>
-        <dgm:shape xmlns:r="http://schemas.openxmlformats.org/officeDocument/2006/relationships" r:blip="">
-          <dgm:adjLst/>
-        </dgm:shape>
-        <dgm:presOf/>
-        <dgm:constrLst>
-          <dgm:constr type="w" for="ch" forName="parentText" refType="w" fact="0.36"/>
-          <dgm:constr type="w" for="ch" forName="descendantText" refType="w" fact="0.64"/>
-          <dgm:constr type="h" for="ch" forName="parentText" refType="h"/>
-          <dgm:constr type="h" for="ch" forName="descendantText" refType="h" refFor="ch" refForName="parentText" fact="0.8"/>
-        </dgm:constrLst>
-        <dgm:ruleLst/>
-        <dgm:layoutNode name="parentText">
-          <dgm:varLst>
-            <dgm:chMax val="1"/>
-            <dgm:bulletEnabled val="1"/>
-          </dgm:varLst>
-          <dgm:alg type="tx"/>
-          <dgm:shape xmlns:r="http://schemas.openxmlformats.org/officeDocument/2006/relationships" type="roundRect" r:blip="" zOrderOff="3">
-            <dgm:adjLst/>
-          </dgm:shape>
-          <dgm:presOf axis="self" ptType="node"/>
-          <dgm:constrLst>
-            <dgm:constr type="tMarg" refType="primFontSz" fact="0.15"/>
-            <dgm:constr type="bMarg" refType="primFontSz" fact="0.15"/>
-            <dgm:constr type="lMarg" refType="primFontSz" fact="0.3"/>
-            <dgm:constr type="rMarg" refType="primFontSz" fact="0.3"/>
-          </dgm:constrLst>
-          <dgm:ruleLst>
-            <dgm:rule type="primFontSz" val="5" fact="NaN" max="NaN"/>
-          </dgm:ruleLst>
-        </dgm:layoutNode>
-        <dgm:choose name="Name8">
-          <dgm:if name="Name9" axis="ch" ptType="node" func="cnt" op="gte" val="1">
-            <dgm:layoutNode name="descendantText" styleLbl="alignAccFollowNode1">
-              <dgm:varLst>
-                <dgm:bulletEnabled val="1"/>
-              </dgm:varLst>
-              <dgm:alg type="tx">
-                <dgm:param type="stBulletLvl" val="1"/>
-                <dgm:param type="txAnchorVertCh" val="mid"/>
-              </dgm:alg>
-              <dgm:choose name="Name10">
-                <dgm:if name="Name11" func="var" arg="dir" op="equ" val="norm">
-                  <dgm:shape xmlns:r="http://schemas.openxmlformats.org/officeDocument/2006/relationships" rot="90" type="round2SameRect" r:blip="">
+    <dgm:forEach name="Name1" axis="ch" ptType="node" st="-1" step="-1">
+      <dgm:choose name="Name2">
+        <dgm:if name="Name3" axis="self" ptType="node" func="revPos" op="equ" val="1">
+          <dgm:layoutNode name="boxAndChildren">
+            <dgm:alg type="composite"/>
+            <dgm:shape xmlns:r="http://schemas.openxmlformats.org/officeDocument/2006/relationships" r:blip="">
+              <dgm:adjLst/>
+            </dgm:shape>
+            <dgm:presOf/>
+            <dgm:choose name="Name4">
+              <dgm:if name="Name5" axis="ch" ptType="node" func="cnt" op="gte" val="1">
+                <dgm:constrLst>
+                  <dgm:constr type="w" for="ch" forName="parentTextBox" refType="w"/>
+                  <dgm:constr type="h" for="ch" forName="parentTextBox" refType="h" fact="0.54"/>
+                  <dgm:constr type="t" for="ch" forName="parentTextBox"/>
+                  <dgm:constr type="w" for="ch" forName="entireBox" refType="w"/>
+                  <dgm:constr type="h" for="ch" forName="entireBox" refType="h"/>
+                  <dgm:constr type="w" for="ch" forName="descendantBox" refType="w"/>
+                  <dgm:constr type="b" for="ch" forName="descendantBox" refType="h" fact="0.98"/>
+                  <dgm:constr type="h" for="ch" forName="descendantBox" refType="h" fact="0.46"/>
+                </dgm:constrLst>
+              </dgm:if>
+              <dgm:else name="Name6">
+                <dgm:constrLst>
+                  <dgm:constr type="w" for="ch" forName="parentTextBox" refType="w"/>
+                  <dgm:constr type="h" for="ch" forName="parentTextBox" refType="h"/>
+                </dgm:constrLst>
+              </dgm:else>
+            </dgm:choose>
+            <dgm:ruleLst/>
+            <dgm:layoutNode name="parentTextBox">
+              <dgm:alg type="tx"/>
+              <dgm:choose name="Name7">
+                <dgm:if name="Name8" axis="ch" ptType="node" func="cnt" op="gte" val="1">
+                  <dgm:shape xmlns:r="http://schemas.openxmlformats.org/officeDocument/2006/relationships" type="rect" r:blip="" zOrderOff="1" hideGeom="1">
                     <dgm:adjLst/>
                   </dgm:shape>
                 </dgm:if>
-                <dgm:else name="Name12">
-                  <dgm:shape xmlns:r="http://schemas.openxmlformats.org/officeDocument/2006/relationships" rot="-90" type="round2SameRect" r:blip="">
+                <dgm:else name="Name9">
+                  <dgm:shape xmlns:r="http://schemas.openxmlformats.org/officeDocument/2006/relationships" type="rect" r:blip="">
                     <dgm:adjLst/>
                   </dgm:shape>
                 </dgm:else>
               </dgm:choose>
-              <dgm:presOf axis="des" ptType="node"/>
-              <dgm:constrLst>
-                <dgm:constr type="secFontSz" val="65"/>
-                <dgm:constr type="primFontSz" refType="secFontSz"/>
-                <dgm:constr type="lMarg" refType="secFontSz" fact="0.3"/>
-                <dgm:constr type="rMarg" refType="secFontSz" fact="0.3"/>
-                <dgm:constr type="tMarg" refType="secFontSz" fact="0.15"/>
-                <dgm:constr type="bMarg" refType="secFontSz" fact="0.15"/>
-              </dgm:constrLst>
+              <dgm:presOf axis="self"/>
+              <dgm:constrLst/>
               <dgm:ruleLst>
-                <dgm:rule type="secFontSz" val="5" fact="NaN" max="NaN"/>
+                <dgm:rule type="primFontSz" val="5" fact="NaN" max="NaN"/>
               </dgm:ruleLst>
             </dgm:layoutNode>
-          </dgm:if>
-          <dgm:else name="Name13"/>
-        </dgm:choose>
-      </dgm:layoutNode>
-      <dgm:forEach name="Name14" axis="followSib" ptType="sibTrans" cnt="1">
+            <dgm:choose name="Name10">
+              <dgm:if name="Name11" axis="ch" ptType="node" func="cnt" op="gte" val="1">
+                <dgm:layoutNode name="entireBox">
+                  <dgm:alg type="sp"/>
+                  <dgm:shape xmlns:r="http://schemas.openxmlformats.org/officeDocument/2006/relationships" type="rect" r:blip="">
+                    <dgm:adjLst/>
+                  </dgm:shape>
+                  <dgm:presOf axis="self"/>
+                  <dgm:constrLst/>
+                  <dgm:ruleLst/>
+                </dgm:layoutNode>
+                <dgm:layoutNode name="descendantBox" styleLbl="fgAccFollowNode1">
+                  <dgm:choose name="Name12">
+                    <dgm:if name="Name13" func="var" arg="dir" op="equ" val="norm">
+                      <dgm:alg type="lin"/>
+                    </dgm:if>
+                    <dgm:else name="Name14">
+                      <dgm:alg type="lin">
+                        <dgm:param type="linDir" val="fromR"/>
+                      </dgm:alg>
+                    </dgm:else>
+                  </dgm:choose>
+                  <dgm:shape xmlns:r="http://schemas.openxmlformats.org/officeDocument/2006/relationships" r:blip="">
+                    <dgm:adjLst/>
+                  </dgm:shape>
+                  <dgm:presOf/>
+                  <dgm:constrLst>
+                    <dgm:constr type="w" for="ch" forName="childTextBox" refType="w"/>
+                    <dgm:constr type="h" for="ch" forName="childTextBox" refType="h"/>
+                  </dgm:constrLst>
+                  <dgm:ruleLst/>
+                  <dgm:forEach name="Name15" axis="ch" ptType="node">
+                    <dgm:layoutNode name="childTextBox" styleLbl="fgAccFollowNode1">
+                      <dgm:varLst>
+                        <dgm:bulletEnabled val="1"/>
+                      </dgm:varLst>
+                      <dgm:alg type="tx"/>
+                      <dgm:shape xmlns:r="http://schemas.openxmlformats.org/officeDocument/2006/relationships" type="rect" r:blip="">
+                        <dgm:adjLst/>
+                      </dgm:shape>
+                      <dgm:presOf axis="desOrSelf" ptType="node"/>
+                      <dgm:constrLst>
+                        <dgm:constr type="tMarg" refType="primFontSz" fact="0.1"/>
+                        <dgm:constr type="bMarg" refType="primFontSz" fact="0.1"/>
+                      </dgm:constrLst>
+                      <dgm:ruleLst>
+                        <dgm:rule type="primFontSz" val="5" fact="NaN" max="NaN"/>
+                      </dgm:ruleLst>
+                    </dgm:layoutNode>
+                  </dgm:forEach>
+                </dgm:layoutNode>
+              </dgm:if>
+              <dgm:else name="Name16"/>
+            </dgm:choose>
+          </dgm:layoutNode>
+        </dgm:if>
+        <dgm:else name="Name17">
+          <dgm:layoutNode name="arrowAndChildren">
+            <dgm:alg type="composite"/>
+            <dgm:shape xmlns:r="http://schemas.openxmlformats.org/officeDocument/2006/relationships" r:blip="">
+              <dgm:adjLst/>
+            </dgm:shape>
+            <dgm:presOf/>
+            <dgm:choose name="Name18">
+              <dgm:if name="Name19" axis="ch" ptType="node" func="cnt" op="gte" val="1">
+                <dgm:constrLst>
+                  <dgm:constr type="w" for="ch" forName="parentTextArrow" refType="w"/>
+                  <dgm:constr type="t" for="ch" forName="parentTextArrow"/>
+                  <dgm:constr type="h" for="ch" forName="parentTextArrow" refType="h" fact="0.351"/>
+                  <dgm:constr type="w" for="ch" forName="arrow" refType="w"/>
+                  <dgm:constr type="h" for="ch" forName="arrow" refType="h"/>
+                  <dgm:constr type="w" for="ch" forName="descendantArrow" refType="w"/>
+                  <dgm:constr type="b" for="ch" forName="descendantArrow" refType="h" fact="0.65"/>
+                  <dgm:constr type="h" for="ch" forName="descendantArrow" refType="h" fact="0.299"/>
+                </dgm:constrLst>
+              </dgm:if>
+              <dgm:else name="Name20">
+                <dgm:constrLst>
+                  <dgm:constr type="w" for="ch" forName="parentTextArrow" refType="w"/>
+                  <dgm:constr type="h" for="ch" forName="parentTextArrow" refType="h"/>
+                </dgm:constrLst>
+              </dgm:else>
+            </dgm:choose>
+            <dgm:ruleLst/>
+            <dgm:layoutNode name="parentTextArrow">
+              <dgm:alg type="tx"/>
+              <dgm:choose name="Name21">
+                <dgm:if name="Name22" axis="ch" ptType="node" func="cnt" op="gte" val="1">
+                  <dgm:shape xmlns:r="http://schemas.openxmlformats.org/officeDocument/2006/relationships" type="rect" r:blip="" zOrderOff="1" hideGeom="1">
+                    <dgm:adjLst/>
+                  </dgm:shape>
+                </dgm:if>
+                <dgm:else name="Name23">
+                  <dgm:shape xmlns:r="http://schemas.openxmlformats.org/officeDocument/2006/relationships" rot="180" type="upArrowCallout" r:blip="">
+                    <dgm:adjLst/>
+                  </dgm:shape>
+                </dgm:else>
+              </dgm:choose>
+              <dgm:presOf axis="self"/>
+              <dgm:constrLst/>
+              <dgm:ruleLst>
+                <dgm:rule type="primFontSz" val="5" fact="NaN" max="NaN"/>
+              </dgm:ruleLst>
+            </dgm:layoutNode>
+            <dgm:choose name="Name24">
+              <dgm:if name="Name25" axis="ch" ptType="node" func="cnt" op="gte" val="1">
+                <dgm:layoutNode name="arrow">
+                  <dgm:alg type="sp"/>
+                  <dgm:shape xmlns:r="http://schemas.openxmlformats.org/officeDocument/2006/relationships" rot="180" type="upArrowCallout" r:blip="">
+                    <dgm:adjLst/>
+                  </dgm:shape>
+                  <dgm:presOf axis="self"/>
+                  <dgm:constrLst/>
+                  <dgm:ruleLst/>
+                </dgm:layoutNode>
+                <dgm:layoutNode name="descendantArrow">
+                  <dgm:choose name="Name26">
+                    <dgm:if name="Name27" func="var" arg="dir" op="equ" val="norm">
+                      <dgm:alg type="lin"/>
+                    </dgm:if>
+                    <dgm:else name="Name28">
+                      <dgm:alg type="lin">
+                        <dgm:param type="linDir" val="fromR"/>
+                      </dgm:alg>
+                    </dgm:else>
+                  </dgm:choose>
+                  <dgm:shape xmlns:r="http://schemas.openxmlformats.org/officeDocument/2006/relationships" r:blip="">
+                    <dgm:adjLst/>
+                  </dgm:shape>
+                  <dgm:presOf/>
+                  <dgm:constrLst>
+                    <dgm:constr type="w" for="ch" forName="childTextArrow" refType="w"/>
+                    <dgm:constr type="h" for="ch" forName="childTextArrow" refType="h"/>
+                  </dgm:constrLst>
+                  <dgm:ruleLst/>
+                  <dgm:forEach name="Name29" axis="ch" ptType="node">
+                    <dgm:layoutNode name="childTextArrow" styleLbl="fgAccFollowNode1">
+                      <dgm:varLst>
+                        <dgm:bulletEnabled val="1"/>
+                      </dgm:varLst>
+                      <dgm:alg type="tx"/>
+                      <dgm:shape xmlns:r="http://schemas.openxmlformats.org/officeDocument/2006/relationships" type="rect" r:blip="">
+                        <dgm:adjLst/>
+                      </dgm:shape>
+                      <dgm:presOf axis="desOrSelf" ptType="node"/>
+                      <dgm:constrLst>
+                        <dgm:constr type="tMarg" refType="primFontSz" fact="0.1"/>
+                        <dgm:constr type="bMarg" refType="primFontSz" fact="0.1"/>
+                      </dgm:constrLst>
+                      <dgm:ruleLst>
+                        <dgm:rule type="primFontSz" val="5" fact="NaN" max="NaN"/>
+                      </dgm:ruleLst>
+                    </dgm:layoutNode>
+                  </dgm:forEach>
+                </dgm:layoutNode>
+              </dgm:if>
+              <dgm:else name="Name30"/>
+            </dgm:choose>
+          </dgm:layoutNode>
+        </dgm:else>
+      </dgm:choose>
+      <dgm:forEach name="Name31" axis="precedSib" ptType="sibTrans" st="-1" cnt="1">
         <dgm:layoutNode name="sp">
           <dgm:alg type="sp"/>
           <dgm:shape xmlns:r="http://schemas.openxmlformats.org/officeDocument/2006/relationships" r:blip="">
             <dgm:adjLst/>
           </dgm:shape>
-          <dgm:presOf/>
+          <dgm:presOf axis="self"/>
           <dgm:constrLst/>
           <dgm:ruleLst/>
         </dgm:layoutNode>
@@ -2091,11 +2222,11 @@
 </file>
 
 <file path=ppt/diagrams/quickStyle1.xml><?xml version="1.0" encoding="utf-8"?>
-<dgm:styleDef xmlns:dgm="http://schemas.openxmlformats.org/drawingml/2006/diagram" xmlns:a="http://schemas.openxmlformats.org/drawingml/2006/main" uniqueId="urn:microsoft.com/office/officeart/2005/8/quickstyle/simple1">
+<dgm:styleDef xmlns:dgm="http://schemas.openxmlformats.org/drawingml/2006/diagram" xmlns:a="http://schemas.openxmlformats.org/drawingml/2006/main" uniqueId="urn:microsoft.com/office/officeart/2005/8/quickstyle/simple3">
   <dgm:title val=""/>
   <dgm:desc val=""/>
   <dgm:catLst>
-    <dgm:cat type="simple" pri="10100"/>
+    <dgm:cat type="simple" pri="10300"/>
   </dgm:catLst>
   <dgm:scene3d>
     <a:camera prst="orthographicFront"/>
@@ -2104,59 +2235,65 @@
   <dgm:styleLbl name="node0">
     <dgm:scene3d>
       <a:camera prst="orthographicFront"/>
-      <a:lightRig rig="threePt" dir="t"/>
+      <a:lightRig rig="flat" dir="t"/>
     </dgm:scene3d>
-    <dgm:sp3d/>
+    <dgm:sp3d prstMaterial="dkEdge">
+      <a:bevelT w="8200" h="38100"/>
+    </dgm:sp3d>
     <dgm:txPr/>
     <dgm:style>
-      <a:lnRef idx="2">
+      <a:lnRef idx="0">
         <a:scrgbClr r="0" g="0" b="0"/>
       </a:lnRef>
-      <a:fillRef idx="1">
+      <a:fillRef idx="2">
         <a:scrgbClr r="0" g="0" b="0"/>
       </a:fillRef>
-      <a:effectRef idx="0">
+      <a:effectRef idx="1">
         <a:scrgbClr r="0" g="0" b="0"/>
       </a:effectRef>
       <a:fontRef idx="minor">
-        <a:schemeClr val="lt1"/>
+        <a:schemeClr val="dk1"/>
       </a:fontRef>
     </dgm:style>
   </dgm:styleLbl>
   <dgm:styleLbl name="lnNode1">
     <dgm:scene3d>
       <a:camera prst="orthographicFront"/>
-      <a:lightRig rig="threePt" dir="t"/>
+      <a:lightRig rig="flat" dir="t"/>
     </dgm:scene3d>
-    <dgm:sp3d/>
+    <dgm:sp3d prstMaterial="dkEdge">
+      <a:bevelT w="8200" h="38100"/>
+    </dgm:sp3d>
     <dgm:txPr/>
     <dgm:style>
-      <a:lnRef idx="2">
+      <a:lnRef idx="1">
         <a:scrgbClr r="0" g="0" b="0"/>
       </a:lnRef>
-      <a:fillRef idx="1">
+      <a:fillRef idx="2">
         <a:scrgbClr r="0" g="0" b="0"/>
       </a:fillRef>
       <a:effectRef idx="0">
         <a:scrgbClr r="0" g="0" b="0"/>
       </a:effectRef>
       <a:fontRef idx="minor">
-        <a:schemeClr val="lt1"/>
+        <a:schemeClr val="dk1"/>
       </a:fontRef>
     </dgm:style>
   </dgm:styleLbl>
   <dgm:styleLbl name="vennNode1">
     <dgm:scene3d>
       <a:camera prst="orthographicFront"/>
-      <a:lightRig rig="threePt" dir="t"/>
+      <a:lightRig rig="flat" dir="t"/>
     </dgm:scene3d>
-    <dgm:sp3d/>
+    <dgm:sp3d prstMaterial="dkEdge">
+      <a:bevelT w="8200" h="38100"/>
+    </dgm:sp3d>
     <dgm:txPr/>
     <dgm:style>
-      <a:lnRef idx="2">
+      <a:lnRef idx="0">
         <a:scrgbClr r="0" g="0" b="0"/>
       </a:lnRef>
-      <a:fillRef idx="1">
+      <a:fillRef idx="2">
         <a:scrgbClr r="0" g="0" b="0"/>
       </a:fillRef>
       <a:effectRef idx="0">
@@ -2175,105 +2312,113 @@
     <dgm:sp3d/>
     <dgm:txPr/>
     <dgm:style>
-      <a:lnRef idx="2">
+      <a:lnRef idx="1">
         <a:scrgbClr r="0" g="0" b="0"/>
       </a:lnRef>
-      <a:fillRef idx="1">
+      <a:fillRef idx="2">
         <a:scrgbClr r="0" g="0" b="0"/>
       </a:fillRef>
-      <a:effectRef idx="0">
+      <a:effectRef idx="1">
         <a:scrgbClr r="0" g="0" b="0"/>
       </a:effectRef>
       <a:fontRef idx="minor">
-        <a:schemeClr val="lt1"/>
+        <a:schemeClr val="dk1"/>
       </a:fontRef>
     </dgm:style>
   </dgm:styleLbl>
   <dgm:styleLbl name="node1">
     <dgm:scene3d>
       <a:camera prst="orthographicFront"/>
-      <a:lightRig rig="threePt" dir="t"/>
+      <a:lightRig rig="flat" dir="t"/>
     </dgm:scene3d>
-    <dgm:sp3d/>
+    <dgm:sp3d prstMaterial="dkEdge">
+      <a:bevelT w="8200" h="38100"/>
+    </dgm:sp3d>
     <dgm:txPr/>
     <dgm:style>
-      <a:lnRef idx="2">
+      <a:lnRef idx="0">
         <a:scrgbClr r="0" g="0" b="0"/>
       </a:lnRef>
-      <a:fillRef idx="1">
+      <a:fillRef idx="2">
         <a:scrgbClr r="0" g="0" b="0"/>
       </a:fillRef>
-      <a:effectRef idx="0">
+      <a:effectRef idx="1">
         <a:scrgbClr r="0" g="0" b="0"/>
       </a:effectRef>
       <a:fontRef idx="minor">
-        <a:schemeClr val="lt1"/>
+        <a:schemeClr val="dk1"/>
       </a:fontRef>
     </dgm:style>
   </dgm:styleLbl>
   <dgm:styleLbl name="node2">
     <dgm:scene3d>
       <a:camera prst="orthographicFront"/>
-      <a:lightRig rig="threePt" dir="t"/>
+      <a:lightRig rig="flat" dir="t"/>
     </dgm:scene3d>
-    <dgm:sp3d/>
+    <dgm:sp3d prstMaterial="dkEdge">
+      <a:bevelT w="8200" h="38100"/>
+    </dgm:sp3d>
     <dgm:txPr/>
     <dgm:style>
-      <a:lnRef idx="2">
+      <a:lnRef idx="0">
         <a:scrgbClr r="0" g="0" b="0"/>
       </a:lnRef>
-      <a:fillRef idx="1">
+      <a:fillRef idx="2">
         <a:scrgbClr r="0" g="0" b="0"/>
       </a:fillRef>
-      <a:effectRef idx="0">
+      <a:effectRef idx="1">
         <a:scrgbClr r="0" g="0" b="0"/>
       </a:effectRef>
       <a:fontRef idx="minor">
-        <a:schemeClr val="lt1"/>
+        <a:schemeClr val="dk1"/>
       </a:fontRef>
     </dgm:style>
   </dgm:styleLbl>
   <dgm:styleLbl name="node3">
     <dgm:scene3d>
       <a:camera prst="orthographicFront"/>
-      <a:lightRig rig="threePt" dir="t"/>
+      <a:lightRig rig="flat" dir="t"/>
     </dgm:scene3d>
-    <dgm:sp3d/>
+    <dgm:sp3d prstMaterial="dkEdge">
+      <a:bevelT w="8200" h="38100"/>
+    </dgm:sp3d>
     <dgm:txPr/>
     <dgm:style>
-      <a:lnRef idx="2">
+      <a:lnRef idx="0">
         <a:scrgbClr r="0" g="0" b="0"/>
       </a:lnRef>
-      <a:fillRef idx="1">
+      <a:fillRef idx="2">
         <a:scrgbClr r="0" g="0" b="0"/>
       </a:fillRef>
-      <a:effectRef idx="0">
+      <a:effectRef idx="1">
         <a:scrgbClr r="0" g="0" b="0"/>
       </a:effectRef>
       <a:fontRef idx="minor">
-        <a:schemeClr val="lt1"/>
+        <a:schemeClr val="dk1"/>
       </a:fontRef>
     </dgm:style>
   </dgm:styleLbl>
   <dgm:styleLbl name="node4">
     <dgm:scene3d>
       <a:camera prst="orthographicFront"/>
-      <a:lightRig rig="threePt" dir="t"/>
+      <a:lightRig rig="flat" dir="t"/>
     </dgm:scene3d>
-    <dgm:sp3d/>
+    <dgm:sp3d prstMaterial="dkEdge">
+      <a:bevelT w="8200" h="38100"/>
+    </dgm:sp3d>
     <dgm:txPr/>
     <dgm:style>
-      <a:lnRef idx="2">
+      <a:lnRef idx="0">
         <a:scrgbClr r="0" g="0" b="0"/>
       </a:lnRef>
-      <a:fillRef idx="1">
+      <a:fillRef idx="2">
         <a:scrgbClr r="0" g="0" b="0"/>
       </a:fillRef>
-      <a:effectRef idx="0">
+      <a:effectRef idx="1">
         <a:scrgbClr r="0" g="0" b="0"/>
       </a:effectRef>
       <a:fontRef idx="minor">
-        <a:schemeClr val="lt1"/>
+        <a:schemeClr val="dk1"/>
       </a:fontRef>
     </dgm:style>
   </dgm:styleLbl>
@@ -2285,13 +2430,13 @@
     <dgm:sp3d/>
     <dgm:txPr/>
     <dgm:style>
-      <a:lnRef idx="2">
+      <a:lnRef idx="1">
         <a:scrgbClr r="0" g="0" b="0"/>
       </a:lnRef>
       <a:fillRef idx="1">
         <a:scrgbClr r="0" g="0" b="0"/>
       </a:fillRef>
-      <a:effectRef idx="0">
+      <a:effectRef idx="1">
         <a:scrgbClr r="0" g="0" b="0"/>
       </a:effectRef>
       <a:fontRef idx="minor"/>
@@ -2305,13 +2450,13 @@
     <dgm:sp3d/>
     <dgm:txPr/>
     <dgm:style>
-      <a:lnRef idx="2">
+      <a:lnRef idx="1">
         <a:scrgbClr r="0" g="0" b="0"/>
       </a:lnRef>
       <a:fillRef idx="1">
         <a:scrgbClr r="0" g="0" b="0"/>
       </a:fillRef>
-      <a:effectRef idx="0">
+      <a:effectRef idx="1">
         <a:scrgbClr r="0" g="0" b="0"/>
       </a:effectRef>
       <a:fontRef idx="minor"/>
@@ -2325,13 +2470,13 @@
     <dgm:sp3d/>
     <dgm:txPr/>
     <dgm:style>
-      <a:lnRef idx="2">
+      <a:lnRef idx="1">
         <a:scrgbClr r="0" g="0" b="0"/>
       </a:lnRef>
       <a:fillRef idx="1">
         <a:scrgbClr r="0" g="0" b="0"/>
       </a:fillRef>
-      <a:effectRef idx="0">
+      <a:effectRef idx="1">
         <a:scrgbClr r="0" g="0" b="0"/>
       </a:effectRef>
       <a:fontRef idx="minor"/>
@@ -2348,14 +2493,14 @@
       <a:lnRef idx="0">
         <a:scrgbClr r="0" g="0" b="0"/>
       </a:lnRef>
-      <a:fillRef idx="1">
+      <a:fillRef idx="2">
         <a:scrgbClr r="0" g="0" b="0"/>
       </a:fillRef>
-      <a:effectRef idx="0">
+      <a:effectRef idx="1">
         <a:scrgbClr r="0" g="0" b="0"/>
       </a:effectRef>
       <a:fontRef idx="minor">
-        <a:schemeClr val="lt1"/>
+        <a:schemeClr val="dk1"/>
       </a:fontRef>
     </dgm:style>
   </dgm:styleLbl>
@@ -2370,14 +2515,14 @@
       <a:lnRef idx="0">
         <a:scrgbClr r="0" g="0" b="0"/>
       </a:lnRef>
-      <a:fillRef idx="1">
+      <a:fillRef idx="2">
         <a:scrgbClr r="0" g="0" b="0"/>
       </a:fillRef>
-      <a:effectRef idx="0">
+      <a:effectRef idx="1">
         <a:scrgbClr r="0" g="0" b="0"/>
       </a:effectRef>
       <a:fontRef idx="minor">
-        <a:schemeClr val="lt1"/>
+        <a:schemeClr val="dk1"/>
       </a:fontRef>
     </dgm:style>
   </dgm:styleLbl>
@@ -2392,14 +2537,14 @@
       <a:lnRef idx="0">
         <a:scrgbClr r="0" g="0" b="0"/>
       </a:lnRef>
-      <a:fillRef idx="1">
+      <a:fillRef idx="2">
         <a:scrgbClr r="0" g="0" b="0"/>
       </a:fillRef>
-      <a:effectRef idx="0">
+      <a:effectRef idx="1">
         <a:scrgbClr r="0" g="0" b="0"/>
       </a:effectRef>
       <a:fontRef idx="minor">
-        <a:schemeClr val="lt1"/>
+        <a:schemeClr val="dk1"/>
       </a:fontRef>
     </dgm:style>
   </dgm:styleLbl>
@@ -2431,13 +2576,13 @@
     <dgm:sp3d/>
     <dgm:txPr/>
     <dgm:style>
-      <a:lnRef idx="2">
+      <a:lnRef idx="1">
         <a:scrgbClr r="0" g="0" b="0"/>
       </a:lnRef>
-      <a:fillRef idx="1">
+      <a:fillRef idx="2">
         <a:scrgbClr r="0" g="0" b="0"/>
       </a:fillRef>
-      <a:effectRef idx="0">
+      <a:effectRef idx="1">
         <a:scrgbClr r="0" g="0" b="0"/>
       </a:effectRef>
       <a:fontRef idx="minor"/>
@@ -2446,110 +2591,120 @@
   <dgm:styleLbl name="asst0">
     <dgm:scene3d>
       <a:camera prst="orthographicFront"/>
-      <a:lightRig rig="threePt" dir="t"/>
+      <a:lightRig rig="flat" dir="t"/>
     </dgm:scene3d>
-    <dgm:sp3d/>
+    <dgm:sp3d prstMaterial="dkEdge">
+      <a:bevelT w="8200" h="38100"/>
+    </dgm:sp3d>
     <dgm:txPr/>
     <dgm:style>
-      <a:lnRef idx="2">
+      <a:lnRef idx="0">
         <a:scrgbClr r="0" g="0" b="0"/>
       </a:lnRef>
-      <a:fillRef idx="1">
+      <a:fillRef idx="2">
         <a:scrgbClr r="0" g="0" b="0"/>
       </a:fillRef>
-      <a:effectRef idx="0">
+      <a:effectRef idx="1">
         <a:scrgbClr r="0" g="0" b="0"/>
       </a:effectRef>
       <a:fontRef idx="minor">
-        <a:schemeClr val="lt1"/>
+        <a:schemeClr val="dk1"/>
       </a:fontRef>
     </dgm:style>
   </dgm:styleLbl>
   <dgm:styleLbl name="asst1">
     <dgm:scene3d>
       <a:camera prst="orthographicFront"/>
-      <a:lightRig rig="threePt" dir="t"/>
+      <a:lightRig rig="flat" dir="t"/>
     </dgm:scene3d>
-    <dgm:sp3d/>
+    <dgm:sp3d prstMaterial="dkEdge">
+      <a:bevelT w="8200" h="38100"/>
+    </dgm:sp3d>
     <dgm:txPr/>
     <dgm:style>
-      <a:lnRef idx="2">
+      <a:lnRef idx="0">
         <a:scrgbClr r="0" g="0" b="0"/>
       </a:lnRef>
-      <a:fillRef idx="1">
+      <a:fillRef idx="2">
         <a:scrgbClr r="0" g="0" b="0"/>
       </a:fillRef>
-      <a:effectRef idx="0">
+      <a:effectRef idx="1">
         <a:scrgbClr r="0" g="0" b="0"/>
       </a:effectRef>
       <a:fontRef idx="minor">
-        <a:schemeClr val="lt1"/>
+        <a:schemeClr val="dk1"/>
       </a:fontRef>
     </dgm:style>
   </dgm:styleLbl>
   <dgm:styleLbl name="asst2">
     <dgm:scene3d>
       <a:camera prst="orthographicFront"/>
-      <a:lightRig rig="threePt" dir="t"/>
+      <a:lightRig rig="flat" dir="t"/>
     </dgm:scene3d>
-    <dgm:sp3d/>
+    <dgm:sp3d prstMaterial="dkEdge">
+      <a:bevelT w="8200" h="38100"/>
+    </dgm:sp3d>
     <dgm:txPr/>
     <dgm:style>
-      <a:lnRef idx="2">
+      <a:lnRef idx="0">
         <a:scrgbClr r="0" g="0" b="0"/>
       </a:lnRef>
-      <a:fillRef idx="1">
+      <a:fillRef idx="2">
         <a:scrgbClr r="0" g="0" b="0"/>
       </a:fillRef>
-      <a:effectRef idx="0">
+      <a:effectRef idx="1">
         <a:scrgbClr r="0" g="0" b="0"/>
       </a:effectRef>
       <a:fontRef idx="minor">
-        <a:schemeClr val="lt1"/>
+        <a:schemeClr val="dk1"/>
       </a:fontRef>
     </dgm:style>
   </dgm:styleLbl>
   <dgm:styleLbl name="asst3">
     <dgm:scene3d>
       <a:camera prst="orthographicFront"/>
-      <a:lightRig rig="threePt" dir="t"/>
+      <a:lightRig rig="flat" dir="t"/>
     </dgm:scene3d>
-    <dgm:sp3d/>
+    <dgm:sp3d prstMaterial="dkEdge">
+      <a:bevelT w="8200" h="38100"/>
+    </dgm:sp3d>
     <dgm:txPr/>
     <dgm:style>
-      <a:lnRef idx="2">
+      <a:lnRef idx="0">
         <a:scrgbClr r="0" g="0" b="0"/>
       </a:lnRef>
-      <a:fillRef idx="1">
+      <a:fillRef idx="2">
         <a:scrgbClr r="0" g="0" b="0"/>
       </a:fillRef>
-      <a:effectRef idx="0">
+      <a:effectRef idx="1">
         <a:scrgbClr r="0" g="0" b="0"/>
       </a:effectRef>
       <a:fontRef idx="minor">
-        <a:schemeClr val="lt1"/>
+        <a:schemeClr val="dk1"/>
       </a:fontRef>
     </dgm:style>
   </dgm:styleLbl>
   <dgm:styleLbl name="asst4">
     <dgm:scene3d>
       <a:camera prst="orthographicFront"/>
-      <a:lightRig rig="threePt" dir="t"/>
+      <a:lightRig rig="flat" dir="t"/>
     </dgm:scene3d>
-    <dgm:sp3d/>
+    <dgm:sp3d prstMaterial="dkEdge">
+      <a:bevelT w="8200" h="38100"/>
+    </dgm:sp3d>
     <dgm:txPr/>
     <dgm:style>
-      <a:lnRef idx="2">
+      <a:lnRef idx="0">
         <a:scrgbClr r="0" g="0" b="0"/>
       </a:lnRef>
-      <a:fillRef idx="1">
+      <a:fillRef idx="2">
         <a:scrgbClr r="0" g="0" b="0"/>
       </a:fillRef>
-      <a:effectRef idx="0">
+      <a:effectRef idx="1">
         <a:scrgbClr r="0" g="0" b="0"/>
       </a:effectRef>
       <a:fontRef idx="minor">
-        <a:schemeClr val="lt1"/>
+        <a:schemeClr val="dk1"/>
       </a:fontRef>
     </dgm:style>
   </dgm:styleLbl>
@@ -2561,17 +2716,17 @@
     <dgm:sp3d/>
     <dgm:txPr/>
     <dgm:style>
-      <a:lnRef idx="2">
+      <a:lnRef idx="1">
         <a:scrgbClr r="0" g="0" b="0"/>
       </a:lnRef>
-      <a:fillRef idx="1">
+      <a:fillRef idx="2">
         <a:scrgbClr r="0" g="0" b="0"/>
       </a:fillRef>
-      <a:effectRef idx="0">
+      <a:effectRef idx="1">
         <a:scrgbClr r="0" g="0" b="0"/>
       </a:effectRef>
       <a:fontRef idx="minor">
-        <a:schemeClr val="lt1"/>
+        <a:schemeClr val="dk1"/>
       </a:fontRef>
     </dgm:style>
   </dgm:styleLbl>
@@ -2583,17 +2738,17 @@
     <dgm:sp3d/>
     <dgm:txPr/>
     <dgm:style>
-      <a:lnRef idx="2">
+      <a:lnRef idx="1">
         <a:scrgbClr r="0" g="0" b="0"/>
       </a:lnRef>
-      <a:fillRef idx="1">
+      <a:fillRef idx="2">
         <a:scrgbClr r="0" g="0" b="0"/>
       </a:fillRef>
-      <a:effectRef idx="0">
+      <a:effectRef idx="1">
         <a:scrgbClr r="0" g="0" b="0"/>
       </a:effectRef>
       <a:fontRef idx="minor">
-        <a:schemeClr val="lt1"/>
+        <a:schemeClr val="dk1"/>
       </a:fontRef>
     </dgm:style>
   </dgm:styleLbl>
@@ -2605,17 +2760,17 @@
     <dgm:sp3d/>
     <dgm:txPr/>
     <dgm:style>
-      <a:lnRef idx="2">
+      <a:lnRef idx="1">
         <a:scrgbClr r="0" g="0" b="0"/>
       </a:lnRef>
-      <a:fillRef idx="1">
+      <a:fillRef idx="2">
         <a:scrgbClr r="0" g="0" b="0"/>
       </a:fillRef>
-      <a:effectRef idx="0">
+      <a:effectRef idx="1">
         <a:scrgbClr r="0" g="0" b="0"/>
       </a:effectRef>
       <a:fontRef idx="minor">
-        <a:schemeClr val="lt1"/>
+        <a:schemeClr val="dk1"/>
       </a:fontRef>
     </dgm:style>
   </dgm:styleLbl>
@@ -2627,17 +2782,17 @@
     <dgm:sp3d/>
     <dgm:txPr/>
     <dgm:style>
-      <a:lnRef idx="2">
+      <a:lnRef idx="1">
         <a:scrgbClr r="0" g="0" b="0"/>
       </a:lnRef>
-      <a:fillRef idx="1">
+      <a:fillRef idx="2">
         <a:scrgbClr r="0" g="0" b="0"/>
       </a:fillRef>
-      <a:effectRef idx="0">
+      <a:effectRef idx="1">
         <a:scrgbClr r="0" g="0" b="0"/>
       </a:effectRef>
       <a:fontRef idx="minor">
-        <a:schemeClr val="lt1"/>
+        <a:schemeClr val="dk1"/>
       </a:fontRef>
     </dgm:style>
   </dgm:styleLbl>
@@ -2729,7 +2884,7 @@
     <dgm:sp3d/>
     <dgm:txPr/>
     <dgm:style>
-      <a:lnRef idx="2">
+      <a:lnRef idx="1">
         <a:scrgbClr r="0" g="0" b="0"/>
       </a:lnRef>
       <a:fillRef idx="1">
@@ -2749,7 +2904,7 @@
     <dgm:sp3d/>
     <dgm:txPr/>
     <dgm:style>
-      <a:lnRef idx="2">
+      <a:lnRef idx="1">
         <a:scrgbClr r="0" g="0" b="0"/>
       </a:lnRef>
       <a:fillRef idx="1">
@@ -2769,7 +2924,7 @@
     <dgm:sp3d/>
     <dgm:txPr/>
     <dgm:style>
-      <a:lnRef idx="2">
+      <a:lnRef idx="1">
         <a:scrgbClr r="0" g="0" b="0"/>
       </a:lnRef>
       <a:fillRef idx="1">
@@ -2809,7 +2964,7 @@
     <dgm:sp3d/>
     <dgm:txPr/>
     <dgm:style>
-      <a:lnRef idx="2">
+      <a:lnRef idx="1">
         <a:scrgbClr r="0" g="0" b="0"/>
       </a:lnRef>
       <a:fillRef idx="1">
@@ -2829,10 +2984,10 @@
     <dgm:sp3d/>
     <dgm:txPr/>
     <dgm:style>
-      <a:lnRef idx="2">
+      <a:lnRef idx="1">
         <a:scrgbClr r="0" g="0" b="0"/>
       </a:lnRef>
-      <a:fillRef idx="1">
+      <a:fillRef idx="2">
         <a:scrgbClr r="0" g="0" b="0"/>
       </a:fillRef>
       <a:effectRef idx="0">
@@ -2849,7 +3004,7 @@
     <dgm:sp3d/>
     <dgm:txPr/>
     <dgm:style>
-      <a:lnRef idx="2">
+      <a:lnRef idx="1">
         <a:scrgbClr r="0" g="0" b="0"/>
       </a:lnRef>
       <a:fillRef idx="1">
@@ -2869,7 +3024,7 @@
     <dgm:sp3d/>
     <dgm:txPr/>
     <dgm:style>
-      <a:lnRef idx="2">
+      <a:lnRef idx="1">
         <a:scrgbClr r="0" g="0" b="0"/>
       </a:lnRef>
       <a:fillRef idx="1">
@@ -2889,7 +3044,7 @@
     <dgm:sp3d/>
     <dgm:txPr/>
     <dgm:style>
-      <a:lnRef idx="2">
+      <a:lnRef idx="1">
         <a:scrgbClr r="0" g="0" b="0"/>
       </a:lnRef>
       <a:fillRef idx="1">
@@ -2909,7 +3064,7 @@
     <dgm:sp3d/>
     <dgm:txPr/>
     <dgm:style>
-      <a:lnRef idx="2">
+      <a:lnRef idx="1">
         <a:scrgbClr r="0" g="0" b="0"/>
       </a:lnRef>
       <a:fillRef idx="1">
@@ -2929,7 +3084,7 @@
     <dgm:sp3d/>
     <dgm:txPr/>
     <dgm:style>
-      <a:lnRef idx="2">
+      <a:lnRef idx="1">
         <a:scrgbClr r="0" g="0" b="0"/>
       </a:lnRef>
       <a:fillRef idx="1">
@@ -2949,7 +3104,7 @@
     <dgm:sp3d/>
     <dgm:txPr/>
     <dgm:style>
-      <a:lnRef idx="2">
+      <a:lnRef idx="1">
         <a:scrgbClr r="0" g="0" b="0"/>
       </a:lnRef>
       <a:fillRef idx="1">
@@ -2969,7 +3124,7 @@
     <dgm:sp3d/>
     <dgm:txPr/>
     <dgm:style>
-      <a:lnRef idx="2">
+      <a:lnRef idx="1">
         <a:scrgbClr r="0" g="0" b="0"/>
       </a:lnRef>
       <a:fillRef idx="1">
@@ -2989,7 +3144,7 @@
     <dgm:sp3d/>
     <dgm:txPr/>
     <dgm:style>
-      <a:lnRef idx="2">
+      <a:lnRef idx="1">
         <a:scrgbClr r="0" g="0" b="0"/>
       </a:lnRef>
       <a:fillRef idx="1">
@@ -3009,7 +3164,7 @@
     <dgm:sp3d/>
     <dgm:txPr/>
     <dgm:style>
-      <a:lnRef idx="2">
+      <a:lnRef idx="1">
         <a:scrgbClr r="0" g="0" b="0"/>
       </a:lnRef>
       <a:fillRef idx="1">
@@ -3035,7 +3190,7 @@
       <a:fillRef idx="1">
         <a:scrgbClr r="0" g="0" b="0"/>
       </a:fillRef>
-      <a:effectRef idx="0">
+      <a:effectRef idx="1">
         <a:scrgbClr r="0" g="0" b="0"/>
       </a:effectRef>
       <a:fontRef idx="minor"/>
@@ -3055,7 +3210,7 @@
       <a:fillRef idx="1">
         <a:scrgbClr r="0" g="0" b="0"/>
       </a:fillRef>
-      <a:effectRef idx="0">
+      <a:effectRef idx="1">
         <a:scrgbClr r="0" g="0" b="0"/>
       </a:effectRef>
       <a:fontRef idx="minor"/>
@@ -3084,18 +3239,20 @@
   <dgm:styleLbl name="fgShp">
     <dgm:scene3d>
       <a:camera prst="orthographicFront"/>
-      <a:lightRig rig="threePt" dir="t"/>
+      <a:lightRig rig="flat" dir="t"/>
     </dgm:scene3d>
-    <dgm:sp3d/>
+    <dgm:sp3d prstMaterial="dkEdge">
+      <a:bevelT w="8200" h="38100"/>
+    </dgm:sp3d>
     <dgm:txPr/>
     <dgm:style>
-      <a:lnRef idx="2">
+      <a:lnRef idx="1">
         <a:scrgbClr r="0" g="0" b="0"/>
       </a:lnRef>
-      <a:fillRef idx="1">
+      <a:fillRef idx="2">
         <a:scrgbClr r="0" g="0" b="0"/>
       </a:fillRef>
-      <a:effectRef idx="0">
+      <a:effectRef idx="1">
         <a:scrgbClr r="0" g="0" b="0"/>
       </a:effectRef>
       <a:fontRef idx="minor"/>
@@ -6680,8 +6837,8 @@
         </p:nvSpPr>
         <p:spPr>
           <a:xfrm>
-            <a:off x="609599" y="5954877"/>
-            <a:ext cx="10058400" cy="21945600"/>
+            <a:off x="618473" y="5903838"/>
+            <a:ext cx="10515600" cy="21945600"/>
           </a:xfrm>
           <a:prstGeom prst="roundRect">
             <a:avLst>
@@ -6943,7 +7100,7 @@
         </p:nvSpPr>
         <p:spPr>
           <a:xfrm>
-            <a:off x="12344398" y="5954876"/>
+            <a:off x="11887200" y="5954875"/>
             <a:ext cx="20116800" cy="11887200"/>
           </a:xfrm>
           <a:prstGeom prst="roundRect">
@@ -7025,8 +7182,8 @@
         </p:nvSpPr>
         <p:spPr>
           <a:xfrm>
-            <a:off x="32966004" y="19007849"/>
-            <a:ext cx="10058404" cy="8999191"/>
+            <a:off x="32757126" y="18698297"/>
+            <a:ext cx="10515600" cy="9151141"/>
           </a:xfrm>
           <a:prstGeom prst="roundRect">
             <a:avLst>
@@ -7281,7 +7438,7 @@
         </p:blipFill>
         <p:spPr bwMode="auto">
           <a:xfrm>
-            <a:off x="25882421" y="6711274"/>
+            <a:off x="25425223" y="6711273"/>
             <a:ext cx="5563517" cy="7315200"/>
           </a:xfrm>
           <a:prstGeom prst="rect">
@@ -7313,7 +7470,7 @@
         </p:nvSpPr>
         <p:spPr>
           <a:xfrm>
-            <a:off x="12904496" y="7711037"/>
+            <a:off x="12447298" y="7711036"/>
             <a:ext cx="5791195" cy="9601200"/>
           </a:xfrm>
           <a:prstGeom prst="roundRect">
@@ -7386,7 +7543,7 @@
         </p:blipFill>
         <p:spPr bwMode="auto">
           <a:xfrm>
-            <a:off x="14818970" y="10144604"/>
+            <a:off x="14361772" y="10144603"/>
             <a:ext cx="1962246" cy="1828800"/>
           </a:xfrm>
           <a:prstGeom prst="rect">
@@ -7431,7 +7588,7 @@
         </p:blipFill>
         <p:spPr bwMode="auto">
           <a:xfrm>
-            <a:off x="14479234" y="13655703"/>
+            <a:off x="14022036" y="13655702"/>
             <a:ext cx="2641717" cy="1828800"/>
           </a:xfrm>
           <a:prstGeom prst="rect">
@@ -7464,7 +7621,7 @@
         </p:nvSpPr>
         <p:spPr>
           <a:xfrm>
-            <a:off x="13175928" y="15484503"/>
+            <a:off x="12718730" y="15484502"/>
             <a:ext cx="5215640" cy="1384995"/>
           </a:xfrm>
           <a:prstGeom prst="rect">
@@ -7513,7 +7670,7 @@
         </p:nvSpPr>
         <p:spPr>
           <a:xfrm>
-            <a:off x="13894635" y="11933684"/>
+            <a:off x="13437437" y="11933683"/>
             <a:ext cx="3810916" cy="1384995"/>
           </a:xfrm>
           <a:prstGeom prst="rect">
@@ -7575,7 +7732,7 @@
         </p:blipFill>
         <p:spPr bwMode="auto">
           <a:xfrm>
-            <a:off x="17987796" y="8968027"/>
+            <a:off x="17530598" y="8968026"/>
             <a:ext cx="5835594" cy="5486400"/>
           </a:xfrm>
           <a:prstGeom prst="rect">
@@ -7739,7 +7896,7 @@
         </p:nvSpPr>
         <p:spPr>
           <a:xfrm>
-            <a:off x="12344398" y="18796001"/>
+            <a:off x="11887199" y="18698297"/>
             <a:ext cx="20116800" cy="9144000"/>
           </a:xfrm>
           <a:prstGeom prst="roundRect">
@@ -7836,7 +7993,7 @@
         </p:blipFill>
         <p:spPr bwMode="auto">
           <a:xfrm>
-            <a:off x="19255789" y="12031069"/>
+            <a:off x="18798591" y="12031068"/>
             <a:ext cx="8508412" cy="5190131"/>
           </a:xfrm>
           <a:prstGeom prst="rect">
@@ -7884,7 +8041,7 @@
         </p:blipFill>
         <p:spPr bwMode="auto">
           <a:xfrm>
-            <a:off x="23435681" y="11586685"/>
+            <a:off x="22978483" y="11586684"/>
             <a:ext cx="1414021" cy="1371600"/>
           </a:xfrm>
           <a:prstGeom prst="rect">
@@ -7931,7 +8088,7 @@
         </p:blipFill>
         <p:spPr bwMode="auto">
           <a:xfrm>
-            <a:off x="25267558" y="10159428"/>
+            <a:off x="24810360" y="10159427"/>
             <a:ext cx="3657600" cy="2657855"/>
           </a:xfrm>
           <a:prstGeom prst="rect">
@@ -7963,8 +8120,8 @@
         </p:nvSpPr>
         <p:spPr>
           <a:xfrm>
-            <a:off x="33196967" y="5954876"/>
-            <a:ext cx="9596478" cy="11887199"/>
+            <a:off x="32757126" y="5903838"/>
+            <a:ext cx="10515600" cy="11887199"/>
           </a:xfrm>
           <a:prstGeom prst="roundRect">
             <a:avLst>
@@ -8027,10 +8184,10 @@
       </p:sp>
       <p:graphicFrame>
         <p:nvGraphicFramePr>
-          <p:cNvPr id="19" name="Diagram 18">
+          <p:cNvPr id="12" name="Diagram 11">
             <a:extLst>
               <a:ext uri="{FF2B5EF4-FFF2-40B4-BE49-F238E27FC236}">
-                <a16:creationId xmlns:a16="http://schemas.microsoft.com/office/drawing/2014/main" id="{5049019B-99B3-51FF-52FE-CA64193DCFE4}"/>
+                <a16:creationId xmlns:a16="http://schemas.microsoft.com/office/drawing/2014/main" id="{37E515A7-40FF-EEF5-BCEF-806C601E2D40}"/>
               </a:ext>
             </a:extLst>
           </p:cNvPr>
@@ -8038,14 +8195,14 @@
           <p:nvPr>
             <p:extLst>
               <p:ext uri="{D42A27DB-BD31-4B8C-83A1-F6EECF244321}">
-                <p14:modId xmlns:p14="http://schemas.microsoft.com/office/powerpoint/2010/main" val="3686065991"/>
+                <p14:modId xmlns:p14="http://schemas.microsoft.com/office/powerpoint/2010/main" val="4080548950"/>
               </p:ext>
             </p:extLst>
           </p:nvPr>
         </p:nvGraphicFramePr>
         <p:xfrm>
-          <a:off x="33783146" y="7789649"/>
-          <a:ext cx="9241262" cy="6160840"/>
+          <a:off x="33375600" y="7711036"/>
+          <a:ext cx="9229725" cy="9510163"/>
         </p:xfrm>
         <a:graphic>
           <a:graphicData uri="http://schemas.openxmlformats.org/drawingml/2006/diagram">

</xml_diff>